<commit_message>
on passe à 3 slides
j'ai viré le slide 1 et 5 
j'ai fusionné les anciens slides 2 et 3 
j'ai modifié les pieds de  pages
</commit_message>
<xml_diff>
--- a/presentation_19nov24.pptx
+++ b/presentation_19nov24.pptx
@@ -5,15 +5,15 @@
     <p:sldMasterId id="2147483684" r:id="rId1"/>
   </p:sldMasterIdLst>
   <p:notesMasterIdLst>
-    <p:notesMasterId r:id="rId8"/>
+    <p:notesMasterId r:id="rId5"/>
   </p:notesMasterIdLst>
+  <p:handoutMasterIdLst>
+    <p:handoutMasterId r:id="rId6"/>
+  </p:handoutMasterIdLst>
   <p:sldIdLst>
-    <p:sldId id="257" r:id="rId2"/>
-    <p:sldId id="265" r:id="rId3"/>
-    <p:sldId id="267" r:id="rId4"/>
-    <p:sldId id="266" r:id="rId5"/>
-    <p:sldId id="268" r:id="rId6"/>
-    <p:sldId id="264" r:id="rId7"/>
+    <p:sldId id="265" r:id="rId2"/>
+    <p:sldId id="266" r:id="rId3"/>
+    <p:sldId id="268" r:id="rId4"/>
   </p:sldIdLst>
   <p:sldSz cx="12192000" cy="6858000"/>
   <p:notesSz cx="6858000" cy="9144000"/>
@@ -301,6 +301,199 @@
 </pc:chgInfo>
 </file>
 
+<file path=ppt/handoutMasters/handoutMaster1.xml><?xml version="1.0" encoding="utf-8"?>
+<p:handoutMaster xmlns:a="http://schemas.openxmlformats.org/drawingml/2006/main" xmlns:r="http://schemas.openxmlformats.org/officeDocument/2006/relationships" xmlns:p="http://schemas.openxmlformats.org/presentationml/2006/main">
+  <p:cSld>
+    <p:bg>
+      <p:bgRef idx="1001">
+        <a:schemeClr val="bg1"/>
+      </p:bgRef>
+    </p:bg>
+    <p:spTree>
+      <p:nvGrpSpPr>
+        <p:cNvPr id="1" name=""/>
+        <p:cNvGrpSpPr/>
+        <p:nvPr/>
+      </p:nvGrpSpPr>
+      <p:grpSpPr>
+        <a:xfrm>
+          <a:off x="0" y="0"/>
+          <a:ext cx="0" cy="0"/>
+          <a:chOff x="0" y="0"/>
+          <a:chExt cx="0" cy="0"/>
+        </a:xfrm>
+      </p:grpSpPr>
+      <p:sp>
+        <p:nvSpPr>
+          <p:cNvPr id="2" name="Espace réservé de l'en-tête 1">
+            <a:extLst>
+              <a:ext uri="{FF2B5EF4-FFF2-40B4-BE49-F238E27FC236}">
+                <a16:creationId xmlns:a16="http://schemas.microsoft.com/office/drawing/2014/main" id="{DAF378A8-BDDA-8252-C26E-16EC4190EBAB}"/>
+              </a:ext>
+            </a:extLst>
+          </p:cNvPr>
+          <p:cNvSpPr>
+            <a:spLocks noGrp="1"/>
+          </p:cNvSpPr>
+          <p:nvPr>
+            <p:ph type="hdr" sz="quarter"/>
+          </p:nvPr>
+        </p:nvSpPr>
+        <p:spPr>
+          <a:xfrm>
+            <a:off x="0" y="0"/>
+            <a:ext cx="2971800" cy="458788"/>
+          </a:xfrm>
+          <a:prstGeom prst="rect">
+            <a:avLst/>
+          </a:prstGeom>
+        </p:spPr>
+        <p:txBody>
+          <a:bodyPr vert="horz" lIns="91440" tIns="45720" rIns="91440" bIns="45720" rtlCol="0"/>
+          <a:lstStyle>
+            <a:lvl1pPr algn="l">
+              <a:defRPr sz="1200"/>
+            </a:lvl1pPr>
+          </a:lstStyle>
+          <a:p>
+            <a:endParaRPr lang="fr-FR"/>
+          </a:p>
+        </p:txBody>
+      </p:sp>
+      <p:sp>
+        <p:nvSpPr>
+          <p:cNvPr id="3" name="Espace réservé de la date 2">
+            <a:extLst>
+              <a:ext uri="{FF2B5EF4-FFF2-40B4-BE49-F238E27FC236}">
+                <a16:creationId xmlns:a16="http://schemas.microsoft.com/office/drawing/2014/main" id="{DE3F2B1D-1890-DF25-EE34-EC22E4B837EC}"/>
+              </a:ext>
+            </a:extLst>
+          </p:cNvPr>
+          <p:cNvSpPr>
+            <a:spLocks noGrp="1"/>
+          </p:cNvSpPr>
+          <p:nvPr>
+            <p:ph type="dt" sz="quarter" idx="1"/>
+          </p:nvPr>
+        </p:nvSpPr>
+        <p:spPr>
+          <a:xfrm>
+            <a:off x="3884613" y="0"/>
+            <a:ext cx="2971800" cy="458788"/>
+          </a:xfrm>
+          <a:prstGeom prst="rect">
+            <a:avLst/>
+          </a:prstGeom>
+        </p:spPr>
+        <p:txBody>
+          <a:bodyPr vert="horz" lIns="91440" tIns="45720" rIns="91440" bIns="45720" rtlCol="0"/>
+          <a:lstStyle>
+            <a:lvl1pPr algn="r">
+              <a:defRPr sz="1200"/>
+            </a:lvl1pPr>
+          </a:lstStyle>
+          <a:p>
+            <a:fld id="{19651C43-9FC8-2340-9C50-D41B95351E05}" type="datetimeFigureOut">
+              <a:rPr lang="fr-FR" smtClean="0"/>
+              <a:t>13/12/2024</a:t>
+            </a:fld>
+            <a:endParaRPr lang="fr-FR"/>
+          </a:p>
+        </p:txBody>
+      </p:sp>
+      <p:sp>
+        <p:nvSpPr>
+          <p:cNvPr id="4" name="Espace réservé du pied de page 3">
+            <a:extLst>
+              <a:ext uri="{FF2B5EF4-FFF2-40B4-BE49-F238E27FC236}">
+                <a16:creationId xmlns:a16="http://schemas.microsoft.com/office/drawing/2014/main" id="{F18981F0-2C0B-0DCF-B142-EFB1DA4F86F3}"/>
+              </a:ext>
+            </a:extLst>
+          </p:cNvPr>
+          <p:cNvSpPr>
+            <a:spLocks noGrp="1"/>
+          </p:cNvSpPr>
+          <p:nvPr>
+            <p:ph type="ftr" sz="quarter" idx="2"/>
+          </p:nvPr>
+        </p:nvSpPr>
+        <p:spPr>
+          <a:xfrm>
+            <a:off x="0" y="8685213"/>
+            <a:ext cx="2971800" cy="458787"/>
+          </a:xfrm>
+          <a:prstGeom prst="rect">
+            <a:avLst/>
+          </a:prstGeom>
+        </p:spPr>
+        <p:txBody>
+          <a:bodyPr vert="horz" lIns="91440" tIns="45720" rIns="91440" bIns="45720" rtlCol="0" anchor="b"/>
+          <a:lstStyle>
+            <a:lvl1pPr algn="l">
+              <a:defRPr sz="1200"/>
+            </a:lvl1pPr>
+          </a:lstStyle>
+          <a:p>
+            <a:r>
+              <a:rPr lang="fr-FR"/>
+              <a:t>allo</a:t>
+            </a:r>
+          </a:p>
+        </p:txBody>
+      </p:sp>
+      <p:sp>
+        <p:nvSpPr>
+          <p:cNvPr id="5" name="Espace réservé du numéro de diapositive 4">
+            <a:extLst>
+              <a:ext uri="{FF2B5EF4-FFF2-40B4-BE49-F238E27FC236}">
+                <a16:creationId xmlns:a16="http://schemas.microsoft.com/office/drawing/2014/main" id="{39E2C295-12C9-1834-7D2D-9B557DA37141}"/>
+              </a:ext>
+            </a:extLst>
+          </p:cNvPr>
+          <p:cNvSpPr>
+            <a:spLocks noGrp="1"/>
+          </p:cNvSpPr>
+          <p:nvPr>
+            <p:ph type="sldNum" sz="quarter" idx="3"/>
+          </p:nvPr>
+        </p:nvSpPr>
+        <p:spPr>
+          <a:xfrm>
+            <a:off x="3884613" y="8685213"/>
+            <a:ext cx="2971800" cy="458787"/>
+          </a:xfrm>
+          <a:prstGeom prst="rect">
+            <a:avLst/>
+          </a:prstGeom>
+        </p:spPr>
+        <p:txBody>
+          <a:bodyPr vert="horz" lIns="91440" tIns="45720" rIns="91440" bIns="45720" rtlCol="0" anchor="b"/>
+          <a:lstStyle>
+            <a:lvl1pPr algn="r">
+              <a:defRPr sz="1200"/>
+            </a:lvl1pPr>
+          </a:lstStyle>
+          <a:p>
+            <a:fld id="{C2F2FED9-FD81-CD4C-BE19-DE593B40F7BD}" type="slidenum">
+              <a:rPr lang="fr-FR" smtClean="0"/>
+              <a:t>‹N°›</a:t>
+            </a:fld>
+            <a:endParaRPr lang="fr-FR"/>
+          </a:p>
+        </p:txBody>
+      </p:sp>
+    </p:spTree>
+    <p:extLst>
+      <p:ext uri="{BB962C8B-B14F-4D97-AF65-F5344CB8AC3E}">
+        <p14:creationId xmlns:p14="http://schemas.microsoft.com/office/powerpoint/2010/main" val="595511736"/>
+      </p:ext>
+    </p:extLst>
+  </p:cSld>
+  <p:clrMap bg1="lt1" tx1="dk1" bg2="lt2" tx2="dk2" accent1="accent1" accent2="accent2" accent3="accent3" accent4="accent4" accent5="accent5" accent6="accent6" hlink="hlink" folHlink="folHlink"/>
+  <p:hf sldNum="0" hdr="0" ftr="0" dt="0"/>
+</p:handoutMaster>
+</file>
+
 <file path=ppt/notesMasters/notesMaster1.xml><?xml version="1.0" encoding="utf-8"?>
 <p:notesMaster xmlns:a="http://schemas.openxmlformats.org/drawingml/2006/main" xmlns:r="http://schemas.openxmlformats.org/officeDocument/2006/relationships" xmlns:p="http://schemas.openxmlformats.org/presentationml/2006/main">
   <p:cSld>
@@ -383,7 +576,7 @@
           <a:p>
             <a:fld id="{38371C7C-ACF4-41C5-A6CE-B62DE1C8D05D}" type="datetimeFigureOut">
               <a:rPr lang="fr-FR" smtClean="0"/>
-              <a:t>11/12/2024</a:t>
+              <a:t>13/12/2024</a:t>
             </a:fld>
             <a:endParaRPr lang="fr-FR"/>
           </a:p>
@@ -508,7 +701,10 @@
             </a:lvl1pPr>
           </a:lstStyle>
           <a:p>
-            <a:endParaRPr lang="fr-FR"/>
+            <a:r>
+              <a:rPr lang="fr-FR"/>
+              <a:t>allo</a:t>
+            </a:r>
           </a:p>
         </p:txBody>
       </p:sp>
@@ -555,6 +751,7 @@
     </p:extLst>
   </p:cSld>
   <p:clrMap bg1="lt1" tx1="dk1" bg2="lt2" tx2="dk2" accent1="accent1" accent2="accent2" accent3="accent3" accent4="accent4" accent5="accent5" accent6="accent6" hlink="hlink" folHlink="folHlink"/>
+  <p:hf sldNum="0" hdr="0" ftr="0" dt="0"/>
   <p:notesStyle>
     <a:lvl1pPr marL="0" algn="l" defTabSz="914400" rtl="0" eaLnBrk="1" latinLnBrk="0" hangingPunct="1">
       <a:defRPr sz="1200" kern="1200">
@@ -698,33 +895,10 @@
           </a:p>
         </p:txBody>
       </p:sp>
-      <p:sp>
-        <p:nvSpPr>
-          <p:cNvPr id="4" name="Espace réservé du numéro de diapositive 3"/>
-          <p:cNvSpPr>
-            <a:spLocks noGrp="1"/>
-          </p:cNvSpPr>
-          <p:nvPr>
-            <p:ph type="sldNum" sz="quarter" idx="5"/>
-          </p:nvPr>
-        </p:nvSpPr>
-        <p:spPr/>
-        <p:txBody>
-          <a:bodyPr/>
-          <a:lstStyle/>
-          <a:p>
-            <a:fld id="{F5B70317-76A5-4A8D-A1F2-986145F74E59}" type="slidenum">
-              <a:rPr lang="fr-FR" smtClean="0"/>
-              <a:t>1</a:t>
-            </a:fld>
-            <a:endParaRPr lang="fr-FR"/>
-          </a:p>
-        </p:txBody>
-      </p:sp>
     </p:spTree>
     <p:extLst>
       <p:ext uri="{BB962C8B-B14F-4D97-AF65-F5344CB8AC3E}">
-        <p14:creationId xmlns:p14="http://schemas.microsoft.com/office/powerpoint/2010/main" val="215308559"/>
+        <p14:creationId xmlns:p14="http://schemas.microsoft.com/office/powerpoint/2010/main" val="3428175425"/>
       </p:ext>
     </p:extLst>
   </p:cSld>
@@ -830,29 +1004,6 @@
           </a:p>
           <a:p>
             <a:endParaRPr lang="fr-FR" dirty="0"/>
-          </a:p>
-        </p:txBody>
-      </p:sp>
-      <p:sp>
-        <p:nvSpPr>
-          <p:cNvPr id="4" name="Espace réservé du numéro de diapositive 3"/>
-          <p:cNvSpPr>
-            <a:spLocks noGrp="1"/>
-          </p:cNvSpPr>
-          <p:nvPr>
-            <p:ph type="sldNum" sz="quarter" idx="5"/>
-          </p:nvPr>
-        </p:nvSpPr>
-        <p:spPr/>
-        <p:txBody>
-          <a:bodyPr/>
-          <a:lstStyle/>
-          <a:p>
-            <a:fld id="{F5B70317-76A5-4A8D-A1F2-986145F74E59}" type="slidenum">
-              <a:rPr lang="fr-FR" smtClean="0"/>
-              <a:t>4</a:t>
-            </a:fld>
-            <a:endParaRPr lang="fr-FR"/>
           </a:p>
         </p:txBody>
       </p:sp>
@@ -980,120 +1131,10 @@
           </a:p>
         </p:txBody>
       </p:sp>
-      <p:sp>
-        <p:nvSpPr>
-          <p:cNvPr id="4" name="Espace réservé du numéro de diapositive 3"/>
-          <p:cNvSpPr>
-            <a:spLocks noGrp="1"/>
-          </p:cNvSpPr>
-          <p:nvPr>
-            <p:ph type="sldNum" sz="quarter" idx="5"/>
-          </p:nvPr>
-        </p:nvSpPr>
-        <p:spPr/>
-        <p:txBody>
-          <a:bodyPr/>
-          <a:lstStyle/>
-          <a:p>
-            <a:fld id="{F5B70317-76A5-4A8D-A1F2-986145F74E59}" type="slidenum">
-              <a:rPr lang="fr-FR" smtClean="0"/>
-              <a:t>5</a:t>
-            </a:fld>
-            <a:endParaRPr lang="fr-FR"/>
-          </a:p>
-        </p:txBody>
-      </p:sp>
     </p:spTree>
     <p:extLst>
       <p:ext uri="{BB962C8B-B14F-4D97-AF65-F5344CB8AC3E}">
         <p14:creationId xmlns:p14="http://schemas.microsoft.com/office/powerpoint/2010/main" val="3817062247"/>
-      </p:ext>
-    </p:extLst>
-  </p:cSld>
-  <p:clrMapOvr>
-    <a:masterClrMapping/>
-  </p:clrMapOvr>
-</p:notes>
-</file>
-
-<file path=ppt/notesSlides/notesSlide4.xml><?xml version="1.0" encoding="utf-8"?>
-<p:notes xmlns:a="http://schemas.openxmlformats.org/drawingml/2006/main" xmlns:r="http://schemas.openxmlformats.org/officeDocument/2006/relationships" xmlns:p="http://schemas.openxmlformats.org/presentationml/2006/main">
-  <p:cSld>
-    <p:spTree>
-      <p:nvGrpSpPr>
-        <p:cNvPr id="1" name=""/>
-        <p:cNvGrpSpPr/>
-        <p:nvPr/>
-      </p:nvGrpSpPr>
-      <p:grpSpPr>
-        <a:xfrm>
-          <a:off x="0" y="0"/>
-          <a:ext cx="0" cy="0"/>
-          <a:chOff x="0" y="0"/>
-          <a:chExt cx="0" cy="0"/>
-        </a:xfrm>
-      </p:grpSpPr>
-      <p:sp>
-        <p:nvSpPr>
-          <p:cNvPr id="2" name="Espace réservé de l'image des diapositives 1"/>
-          <p:cNvSpPr>
-            <a:spLocks noGrp="1" noRot="1" noChangeAspect="1"/>
-          </p:cNvSpPr>
-          <p:nvPr>
-            <p:ph type="sldImg"/>
-          </p:nvPr>
-        </p:nvSpPr>
-        <p:spPr/>
-      </p:sp>
-      <p:sp>
-        <p:nvSpPr>
-          <p:cNvPr id="3" name="Espace réservé des notes 2"/>
-          <p:cNvSpPr>
-            <a:spLocks noGrp="1"/>
-          </p:cNvSpPr>
-          <p:nvPr>
-            <p:ph type="body" idx="1"/>
-          </p:nvPr>
-        </p:nvSpPr>
-        <p:spPr/>
-        <p:txBody>
-          <a:bodyPr/>
-          <a:lstStyle/>
-          <a:p>
-            <a:r>
-              <a:rPr lang="fr-FR" dirty="0"/>
-              <a:t>Je vous remercie de votre écoute et je vous laisse la parole</a:t>
-            </a:r>
-          </a:p>
-        </p:txBody>
-      </p:sp>
-      <p:sp>
-        <p:nvSpPr>
-          <p:cNvPr id="4" name="Espace réservé du numéro de diapositive 3"/>
-          <p:cNvSpPr>
-            <a:spLocks noGrp="1"/>
-          </p:cNvSpPr>
-          <p:nvPr>
-            <p:ph type="sldNum" sz="quarter" idx="5"/>
-          </p:nvPr>
-        </p:nvSpPr>
-        <p:spPr/>
-        <p:txBody>
-          <a:bodyPr/>
-          <a:lstStyle/>
-          <a:p>
-            <a:fld id="{F5B70317-76A5-4A8D-A1F2-986145F74E59}" type="slidenum">
-              <a:rPr lang="fr-FR" smtClean="0"/>
-              <a:t>6</a:t>
-            </a:fld>
-            <a:endParaRPr lang="fr-FR"/>
-          </a:p>
-        </p:txBody>
-      </p:sp>
-    </p:spTree>
-    <p:extLst>
-      <p:ext uri="{BB962C8B-B14F-4D97-AF65-F5344CB8AC3E}">
-        <p14:creationId xmlns:p14="http://schemas.microsoft.com/office/powerpoint/2010/main" val="818226664"/>
       </p:ext>
     </p:extLst>
   </p:cSld>
@@ -1327,11 +1368,10 @@
           <a:bodyPr/>
           <a:lstStyle/>
           <a:p>
-            <a:fld id="{54C73724-1D36-41E4-BCB1-119F74512719}" type="datetime1">
-              <a:rPr lang="fr-FR" smtClean="0"/>
-              <a:t>11/12/2024</a:t>
-            </a:fld>
-            <a:endParaRPr lang="fr-FR"/>
+            <a:r>
+              <a:rPr lang="fr-FR"/>
+              <a:t>19/12/2024</a:t>
+            </a:r>
           </a:p>
         </p:txBody>
       </p:sp>
@@ -1350,7 +1390,11 @@
           <a:bodyPr/>
           <a:lstStyle/>
           <a:p>
-            <a:endParaRPr lang="fr-FR"/>
+            <a:r>
+              <a:rPr lang="fr-FR"/>
+              <a:t>RSX217 +Traffic Engineering in SDN Using OpenFlow </a:t>
+            </a:r>
           </a:p>
         </p:txBody>
       </p:sp>
@@ -1535,11 +1579,10 @@
           <a:bodyPr/>
           <a:lstStyle/>
           <a:p>
-            <a:fld id="{D003649F-F7E4-4E0A-8440-AF7C9B02B7EC}" type="datetime1">
-              <a:rPr lang="fr-FR" smtClean="0"/>
-              <a:t>11/12/2024</a:t>
-            </a:fld>
-            <a:endParaRPr lang="fr-FR"/>
+            <a:r>
+              <a:rPr lang="fr-FR"/>
+              <a:t>19/12/2024</a:t>
+            </a:r>
           </a:p>
         </p:txBody>
       </p:sp>
@@ -1558,7 +1601,11 @@
           <a:bodyPr/>
           <a:lstStyle/>
           <a:p>
-            <a:endParaRPr lang="fr-FR"/>
+            <a:r>
+              <a:rPr lang="fr-FR"/>
+              <a:t>RSX217 +Traffic Engineering in SDN Using OpenFlow </a:t>
+            </a:r>
           </a:p>
         </p:txBody>
       </p:sp>
@@ -1791,11 +1838,10 @@
           <a:bodyPr/>
           <a:lstStyle/>
           <a:p>
-            <a:fld id="{617CF0CE-3253-4CA0-8090-39BF047AB0B2}" type="datetime1">
-              <a:rPr lang="fr-FR" smtClean="0"/>
-              <a:t>11/12/2024</a:t>
-            </a:fld>
-            <a:endParaRPr lang="fr-FR"/>
+            <a:r>
+              <a:rPr lang="fr-FR"/>
+              <a:t>19/12/2024</a:t>
+            </a:r>
           </a:p>
         </p:txBody>
       </p:sp>
@@ -1814,7 +1860,11 @@
           <a:bodyPr/>
           <a:lstStyle/>
           <a:p>
-            <a:endParaRPr lang="fr-FR"/>
+            <a:r>
+              <a:rPr lang="fr-FR"/>
+              <a:t>RSX217 +Traffic Engineering in SDN Using OpenFlow </a:t>
+            </a:r>
           </a:p>
         </p:txBody>
       </p:sp>
@@ -1961,11 +2011,10 @@
           <a:bodyPr/>
           <a:lstStyle/>
           <a:p>
-            <a:fld id="{3CD439B7-47A2-4D20-A105-3C85ABDFC4AC}" type="datetime1">
-              <a:rPr lang="fr-FR" smtClean="0"/>
-              <a:t>11/12/2024</a:t>
-            </a:fld>
-            <a:endParaRPr lang="fr-FR"/>
+            <a:r>
+              <a:rPr lang="fr-FR"/>
+              <a:t>19/12/2024</a:t>
+            </a:r>
           </a:p>
         </p:txBody>
       </p:sp>
@@ -1984,7 +2033,11 @@
           <a:bodyPr/>
           <a:lstStyle/>
           <a:p>
-            <a:endParaRPr lang="fr-FR"/>
+            <a:r>
+              <a:rPr lang="fr-FR"/>
+              <a:t>RSX217 +Traffic Engineering in SDN Using OpenFlow </a:t>
+            </a:r>
           </a:p>
         </p:txBody>
       </p:sp>
@@ -2304,11 +2357,10 @@
           <a:bodyPr/>
           <a:lstStyle/>
           <a:p>
-            <a:fld id="{6C24A06F-185E-4665-957C-F8EC0670C1D8}" type="datetime1">
-              <a:rPr lang="fr-FR" smtClean="0"/>
-              <a:t>11/12/2024</a:t>
-            </a:fld>
-            <a:endParaRPr lang="fr-FR"/>
+            <a:r>
+              <a:rPr lang="fr-FR"/>
+              <a:t>19/12/2024</a:t>
+            </a:r>
           </a:p>
         </p:txBody>
       </p:sp>
@@ -2327,7 +2379,11 @@
           <a:bodyPr/>
           <a:lstStyle/>
           <a:p>
-            <a:endParaRPr lang="fr-FR"/>
+            <a:r>
+              <a:rPr lang="fr-FR"/>
+              <a:t>RSX217 +Traffic Engineering in SDN Using OpenFlow </a:t>
+            </a:r>
           </a:p>
         </p:txBody>
       </p:sp>
@@ -2579,11 +2635,10 @@
           <a:bodyPr/>
           <a:lstStyle/>
           <a:p>
-            <a:fld id="{0F62F617-E0D9-4F4C-AC1A-5F7CDDCF9548}" type="datetime1">
-              <a:rPr lang="fr-FR" smtClean="0"/>
-              <a:t>11/12/2024</a:t>
-            </a:fld>
-            <a:endParaRPr lang="fr-FR"/>
+            <a:r>
+              <a:rPr lang="fr-FR"/>
+              <a:t>19/12/2024</a:t>
+            </a:r>
           </a:p>
         </p:txBody>
       </p:sp>
@@ -2602,7 +2657,11 @@
           <a:bodyPr/>
           <a:lstStyle/>
           <a:p>
-            <a:endParaRPr lang="fr-FR"/>
+            <a:r>
+              <a:rPr lang="fr-FR"/>
+              <a:t>RSX217 +Traffic Engineering in SDN Using OpenFlow </a:t>
+            </a:r>
           </a:p>
         </p:txBody>
       </p:sp>
@@ -2958,11 +3017,10 @@
           <a:bodyPr/>
           <a:lstStyle/>
           <a:p>
-            <a:fld id="{906C7ADA-53E9-4EC4-A47F-2C9D4529C8E5}" type="datetime1">
-              <a:rPr lang="fr-FR" smtClean="0"/>
-              <a:t>11/12/2024</a:t>
-            </a:fld>
-            <a:endParaRPr lang="fr-FR"/>
+            <a:r>
+              <a:rPr lang="fr-FR"/>
+              <a:t>19/12/2024</a:t>
+            </a:r>
           </a:p>
         </p:txBody>
       </p:sp>
@@ -2981,7 +3039,11 @@
           <a:bodyPr/>
           <a:lstStyle/>
           <a:p>
-            <a:endParaRPr lang="fr-FR"/>
+            <a:r>
+              <a:rPr lang="fr-FR"/>
+              <a:t>RSX217 +Traffic Engineering in SDN Using OpenFlow </a:t>
+            </a:r>
           </a:p>
         </p:txBody>
       </p:sp>
@@ -3076,11 +3138,10 @@
           <a:bodyPr/>
           <a:lstStyle/>
           <a:p>
-            <a:fld id="{99D30EC3-A45D-4E0A-8C4C-C4D456521DE0}" type="datetime1">
-              <a:rPr lang="fr-FR" smtClean="0"/>
-              <a:t>11/12/2024</a:t>
-            </a:fld>
-            <a:endParaRPr lang="fr-FR"/>
+            <a:r>
+              <a:rPr lang="fr-FR"/>
+              <a:t>19/12/2024</a:t>
+            </a:r>
           </a:p>
         </p:txBody>
       </p:sp>
@@ -3099,7 +3160,11 @@
           <a:bodyPr/>
           <a:lstStyle/>
           <a:p>
-            <a:endParaRPr lang="fr-FR"/>
+            <a:r>
+              <a:rPr lang="fr-FR"/>
+              <a:t>RSX217 +Traffic Engineering in SDN Using OpenFlow </a:t>
+            </a:r>
           </a:p>
         </p:txBody>
       </p:sp>
@@ -3247,11 +3312,10 @@
           <a:bodyPr/>
           <a:lstStyle/>
           <a:p>
-            <a:fld id="{E289BD44-461E-4D79-93EF-AF1D69ABB101}" type="datetime1">
-              <a:rPr lang="fr-FR" smtClean="0"/>
-              <a:t>11/12/2024</a:t>
-            </a:fld>
-            <a:endParaRPr lang="fr-FR"/>
+            <a:r>
+              <a:rPr lang="fr-FR"/>
+              <a:t>19/12/2024</a:t>
+            </a:r>
           </a:p>
         </p:txBody>
       </p:sp>
@@ -3278,7 +3342,11 @@
             </a:lvl1pPr>
           </a:lstStyle>
           <a:p>
-            <a:endParaRPr lang="fr-FR"/>
+            <a:r>
+              <a:rPr lang="fr-FR"/>
+              <a:t>RSX217 +Traffic Engineering in SDN Using OpenFlow </a:t>
+            </a:r>
           </a:p>
         </p:txBody>
       </p:sp>
@@ -3601,11 +3669,10 @@
             </a:lvl1pPr>
           </a:lstStyle>
           <a:p>
-            <a:fld id="{6FE776C5-D204-4E59-BDEF-9C487F351902}" type="datetime1">
-              <a:rPr lang="fr-FR" smtClean="0"/>
-              <a:t>11/12/2024</a:t>
-            </a:fld>
-            <a:endParaRPr lang="fr-FR"/>
+            <a:r>
+              <a:rPr lang="fr-FR"/>
+              <a:t>19/12/2024</a:t>
+            </a:r>
           </a:p>
         </p:txBody>
       </p:sp>
@@ -3637,7 +3704,11 @@
             </a:lvl1pPr>
           </a:lstStyle>
           <a:p>
-            <a:endParaRPr lang="fr-FR"/>
+            <a:r>
+              <a:rPr lang="fr-FR"/>
+              <a:t>RSX217 +Traffic Engineering in SDN Using OpenFlow </a:t>
+            </a:r>
           </a:p>
         </p:txBody>
       </p:sp>
@@ -3978,11 +4049,10 @@
           <a:bodyPr/>
           <a:lstStyle/>
           <a:p>
-            <a:fld id="{C0E720FD-2DC7-4FCA-BB00-170E50258B17}" type="datetime1">
-              <a:rPr lang="fr-FR" smtClean="0"/>
-              <a:t>11/12/2024</a:t>
-            </a:fld>
-            <a:endParaRPr lang="fr-FR"/>
+            <a:r>
+              <a:rPr lang="fr-FR"/>
+              <a:t>19/12/2024</a:t>
+            </a:r>
           </a:p>
         </p:txBody>
       </p:sp>
@@ -4001,7 +4071,11 @@
           <a:bodyPr/>
           <a:lstStyle/>
           <a:p>
-            <a:endParaRPr lang="fr-FR"/>
+            <a:r>
+              <a:rPr lang="fr-FR"/>
+              <a:t>RSX217 +Traffic Engineering in SDN Using OpenFlow </a:t>
+            </a:r>
           </a:p>
         </p:txBody>
       </p:sp>
@@ -4265,11 +4339,10 @@
             </a:lvl1pPr>
           </a:lstStyle>
           <a:p>
-            <a:fld id="{54BA97AC-DA35-4323-B95C-30F7E40A6A86}" type="datetime1">
-              <a:rPr lang="fr-FR" smtClean="0"/>
-              <a:t>11/12/2024</a:t>
-            </a:fld>
-            <a:endParaRPr lang="fr-FR"/>
+            <a:r>
+              <a:rPr lang="fr-FR"/>
+              <a:t>19/12/2024</a:t>
+            </a:r>
           </a:p>
         </p:txBody>
       </p:sp>
@@ -4304,7 +4377,11 @@
             </a:lvl1pPr>
           </a:lstStyle>
           <a:p>
-            <a:endParaRPr lang="fr-FR"/>
+            <a:r>
+              <a:rPr lang="fr-FR"/>
+              <a:t>RSX217 +Traffic Engineering in SDN Using OpenFlow </a:t>
+            </a:r>
           </a:p>
         </p:txBody>
       </p:sp>
@@ -4406,7 +4483,7 @@
     <p:sldLayoutId id="2147483694" r:id="rId10"/>
     <p:sldLayoutId id="2147483695" r:id="rId11"/>
   </p:sldLayoutIdLst>
-  <p:hf hdr="0" ftr="0" dt="0"/>
+  <p:hf sldNum="0" hdr="0"/>
   <p:txStyles>
     <p:titleStyle>
       <a:lvl1pPr algn="l" defTabSz="914400" rtl="0" eaLnBrk="1" latinLnBrk="0" hangingPunct="1">
@@ -4797,7 +4874,7 @@
           <p:cNvPr id="2" name="Titre 1">
             <a:extLst>
               <a:ext uri="{FF2B5EF4-FFF2-40B4-BE49-F238E27FC236}">
-                <a16:creationId xmlns:a16="http://schemas.microsoft.com/office/drawing/2014/main" id="{AF6A0BB5-4697-2898-C3D8-B902F78113C5}"/>
+                <a16:creationId xmlns:a16="http://schemas.microsoft.com/office/drawing/2014/main" id="{7C163BA1-EA14-4132-EC26-BEE79038FA44}"/>
               </a:ext>
             </a:extLst>
           </p:cNvPr>
@@ -4805,165 +4882,389 @@
             <a:spLocks noGrp="1"/>
           </p:cNvSpPr>
           <p:nvPr>
-            <p:ph type="ctrTitle"/>
-          </p:nvPr>
-        </p:nvSpPr>
-        <p:spPr>
-          <a:xfrm>
-            <a:off x="1097280" y="503584"/>
-            <a:ext cx="10058400" cy="3816626"/>
-          </a:xfrm>
-        </p:spPr>
-        <p:txBody>
-          <a:bodyPr>
-            <a:normAutofit fontScale="90000"/>
-          </a:bodyPr>
+            <p:ph type="title"/>
+          </p:nvPr>
+        </p:nvSpPr>
+        <p:spPr/>
+        <p:txBody>
+          <a:bodyPr/>
           <a:lstStyle/>
           <a:p>
             <a:pPr algn="ctr"/>
             <a:r>
-              <a:rPr lang="fr-FR" sz="3000" dirty="0"/>
-              <a:t> </a:t>
-            </a:r>
-            <a:br>
-              <a:rPr lang="fr-FR" sz="3000" dirty="0"/>
-            </a:br>
-            <a:br>
-              <a:rPr lang="fr-FR" sz="3000" dirty="0"/>
-            </a:br>
-            <a:br>
-              <a:rPr lang="fr-FR" sz="3000" dirty="0"/>
-            </a:br>
-            <a:r>
-              <a:rPr lang="fr-FR" sz="3000" dirty="0"/>
-              <a:t>Mini projet  RSX217 2024/2025</a:t>
-            </a:r>
-            <a:br>
-              <a:rPr lang="fr-FR" sz="3000" dirty="0"/>
-            </a:br>
-            <a:br>
-              <a:rPr lang="fr-FR" sz="3000" dirty="0"/>
-            </a:br>
-            <a:br>
-              <a:rPr lang="fr-FR" sz="3000" dirty="0"/>
-            </a:br>
-            <a:r>
-              <a:rPr lang="fr-FR" sz="2700" b="1" dirty="0">
-                <a:latin typeface="Arial Rounded MT Bold" panose="020F0704030504030204" pitchFamily="34" charset="77"/>
-              </a:rPr>
-              <a:t>Traffic Engineering in SDN</a:t>
-            </a:r>
-            <a:br>
-              <a:rPr lang="fr-FR" sz="2700" b="1" dirty="0">
-                <a:latin typeface="Arial Rounded MT Bold" panose="020F0704030504030204" pitchFamily="34" charset="77"/>
-              </a:rPr>
-            </a:br>
-            <a:r>
-              <a:rPr lang="fr-FR" sz="2700" b="1" dirty="0" err="1">
-                <a:latin typeface="Arial Rounded MT Bold" panose="020F0704030504030204" pitchFamily="34" charset="77"/>
-              </a:rPr>
-              <a:t>Using</a:t>
-            </a:r>
-            <a:r>
-              <a:rPr lang="fr-FR" sz="2700" b="1" dirty="0">
-                <a:latin typeface="Arial Rounded MT Bold" panose="020F0704030504030204" pitchFamily="34" charset="77"/>
-              </a:rPr>
-              <a:t> </a:t>
-            </a:r>
-            <a:r>
-              <a:rPr lang="fr-FR" sz="2700" b="1" dirty="0" err="1">
-                <a:latin typeface="Arial Rounded MT Bold" panose="020F0704030504030204" pitchFamily="34" charset="77"/>
-              </a:rPr>
-              <a:t>OpenFlow</a:t>
-            </a:r>
-            <a:br>
-              <a:rPr lang="fr-FR" sz="3000" dirty="0"/>
-            </a:br>
-            <a:br>
-              <a:rPr lang="fr-FR" sz="3000" dirty="0"/>
-            </a:br>
-            <a:br>
-              <a:rPr lang="fr-FR" sz="3000" dirty="0"/>
-            </a:br>
-            <a:r>
-              <a:rPr lang="fr-FR" sz="3000" dirty="0"/>
-              <a:t>Pré-soutenance </a:t>
-            </a:r>
-            <a:br>
-              <a:rPr lang="fr-FR" sz="3000" dirty="0"/>
-            </a:br>
-            <a:r>
-              <a:rPr lang="fr-FR" sz="3000" dirty="0"/>
-              <a:t>Jeudi 19 décembre 2024</a:t>
-            </a:r>
-            <a:br>
-              <a:rPr lang="fr-FR" sz="3000" dirty="0"/>
-            </a:br>
-            <a:endParaRPr lang="fr-FR" sz="3000" dirty="0"/>
-          </a:p>
-        </p:txBody>
-      </p:sp>
-      <p:sp>
-        <p:nvSpPr>
-          <p:cNvPr id="3" name="Sous-titre 2">
+              <a:rPr lang="fr-FR" dirty="0"/>
+              <a:t>Préparation de l’environnement </a:t>
+            </a:r>
+          </a:p>
+        </p:txBody>
+      </p:sp>
+      <p:sp>
+        <p:nvSpPr>
+          <p:cNvPr id="3" name="ZoneTexte 2">
             <a:extLst>
               <a:ext uri="{FF2B5EF4-FFF2-40B4-BE49-F238E27FC236}">
-                <a16:creationId xmlns:a16="http://schemas.microsoft.com/office/drawing/2014/main" id="{BB41E931-AF86-E644-FD9B-F99CFD3CDF50}"/>
+                <a16:creationId xmlns:a16="http://schemas.microsoft.com/office/drawing/2014/main" id="{A8D2952B-24C8-C36C-DDEB-A60B6602BDBA}"/>
               </a:ext>
             </a:extLst>
           </p:cNvPr>
-          <p:cNvSpPr>
-            <a:spLocks noGrp="1"/>
-          </p:cNvSpPr>
-          <p:nvPr>
-            <p:ph type="subTitle" idx="1"/>
-          </p:nvPr>
-        </p:nvSpPr>
-        <p:spPr/>
-        <p:txBody>
-          <a:bodyPr>
-            <a:normAutofit fontScale="47500" lnSpcReduction="20000"/>
+          <p:cNvSpPr txBox="1"/>
+          <p:nvPr/>
+        </p:nvSpPr>
+        <p:spPr>
+          <a:xfrm>
+            <a:off x="1703540" y="2141951"/>
+            <a:ext cx="8906005" cy="3170099"/>
+          </a:xfrm>
+          <a:prstGeom prst="rect">
+            <a:avLst/>
+          </a:prstGeom>
+          <a:noFill/>
+        </p:spPr>
+        <p:txBody>
+          <a:bodyPr wrap="square" rtlCol="0">
+            <a:spAutoFit/>
           </a:bodyPr>
           <a:lstStyle/>
           <a:p>
-            <a:r>
-              <a:rPr lang="en-GB" dirty="0"/>
-              <a:t>Jouve guillaume 							2024/2025</a:t>
-            </a:r>
-          </a:p>
-          <a:p>
-            <a:r>
-              <a:rPr lang="en-GB" dirty="0"/>
-              <a:t>MARTIN Anthony</a:t>
-            </a:r>
-          </a:p>
-          <a:p>
-            <a:r>
-              <a:rPr lang="en-GB" dirty="0" err="1"/>
-              <a:t>CarluccI</a:t>
-            </a:r>
-            <a:r>
-              <a:rPr lang="en-GB" dirty="0"/>
-              <a:t> TEDDY</a:t>
-            </a:r>
-          </a:p>
-          <a:p>
-            <a:r>
-              <a:rPr lang="en-GB" dirty="0" err="1"/>
-              <a:t>MAIRe</a:t>
-            </a:r>
-            <a:r>
-              <a:rPr lang="en-GB" dirty="0"/>
-              <a:t> OLIVIER</a:t>
+            <a:pPr marL="285750" indent="-285750">
+              <a:buFont typeface="Arial" panose="020B0604020202020204" pitchFamily="34" charset="0"/>
+              <a:buChar char="•"/>
+            </a:pPr>
+            <a:r>
+              <a:rPr lang="fr-FR" sz="2000" dirty="0"/>
+              <a:t>Organisation</a:t>
+            </a:r>
+          </a:p>
+          <a:p>
+            <a:pPr marL="742950" lvl="1" indent="-285750">
+              <a:buFont typeface="Arial" panose="020B0604020202020204" pitchFamily="34" charset="0"/>
+              <a:buChar char="•"/>
+            </a:pPr>
+            <a:r>
+              <a:rPr lang="fr-FR" sz="2000" dirty="0"/>
+              <a:t>Utilisation de planner (à faire , en cours, fait)</a:t>
+            </a:r>
+          </a:p>
+          <a:p>
+            <a:pPr marL="742950" lvl="1" indent="-285750">
+              <a:buFont typeface="Arial" panose="020B0604020202020204" pitchFamily="34" charset="0"/>
+              <a:buChar char="•"/>
+            </a:pPr>
+            <a:r>
+              <a:rPr lang="fr-FR" sz="2000" dirty="0"/>
+              <a:t>Création équipe teams</a:t>
+            </a:r>
+          </a:p>
+          <a:p>
+            <a:pPr marL="742950" lvl="1" indent="-285750">
+              <a:buFont typeface="Arial" panose="020B0604020202020204" pitchFamily="34" charset="0"/>
+              <a:buChar char="•"/>
+            </a:pPr>
+            <a:r>
+              <a:rPr lang="fr-FR" sz="2000" dirty="0"/>
+              <a:t> Visio teams réguliers</a:t>
+            </a:r>
+          </a:p>
+          <a:p>
+            <a:pPr marL="742950" lvl="1" indent="-285750">
+              <a:buFont typeface="Arial" panose="020B0604020202020204" pitchFamily="34" charset="0"/>
+              <a:buChar char="•"/>
+            </a:pPr>
+            <a:r>
+              <a:rPr lang="fr-FR" sz="2000" dirty="0"/>
+              <a:t>Echanges par chat team asynchrones</a:t>
+            </a:r>
+          </a:p>
+          <a:p>
+            <a:pPr marL="285750" indent="-285750">
+              <a:buFont typeface="Arial" panose="020B0604020202020204" pitchFamily="34" charset="0"/>
+              <a:buChar char="•"/>
+            </a:pPr>
+            <a:r>
+              <a:rPr lang="fr-FR" sz="2000" dirty="0"/>
+              <a:t>Outils</a:t>
+            </a:r>
+          </a:p>
+          <a:p>
+            <a:pPr marL="742950" lvl="1" indent="-285750">
+              <a:buFont typeface="Arial" panose="020B0604020202020204" pitchFamily="34" charset="0"/>
+              <a:buChar char="•"/>
+            </a:pPr>
+            <a:r>
+              <a:rPr lang="fr-FR" sz="2000" dirty="0"/>
+              <a:t>VM guacamole</a:t>
+            </a:r>
+          </a:p>
+          <a:p>
+            <a:pPr marL="1200150" lvl="2" indent="-285750">
+              <a:buFont typeface="Arial" panose="020B0604020202020204" pitchFamily="34" charset="0"/>
+              <a:buChar char="•"/>
+            </a:pPr>
+            <a:r>
+              <a:rPr lang="fr-FR" sz="2000" dirty="0"/>
+              <a:t>Update python</a:t>
+            </a:r>
+          </a:p>
+          <a:p>
+            <a:pPr marL="1200150" lvl="2" indent="-285750">
+              <a:buFont typeface="Arial" panose="020B0604020202020204" pitchFamily="34" charset="0"/>
+              <a:buChar char="•"/>
+            </a:pPr>
+            <a:r>
+              <a:rPr lang="fr-FR" sz="2000" dirty="0"/>
+              <a:t>Update </a:t>
+            </a:r>
+            <a:r>
+              <a:rPr lang="fr-FR" sz="2000" dirty="0" err="1"/>
+              <a:t>mininet</a:t>
+            </a:r>
+            <a:endParaRPr lang="fr-FR" sz="2000" dirty="0"/>
+          </a:p>
+          <a:p>
+            <a:pPr marL="742950" lvl="1" indent="-285750">
+              <a:buFont typeface="Arial" panose="020B0604020202020204" pitchFamily="34" charset="0"/>
+              <a:buChar char="•"/>
+            </a:pPr>
+            <a:r>
+              <a:rPr lang="fr-FR" sz="2000" dirty="0"/>
+              <a:t>Création projet privé </a:t>
+            </a:r>
+            <a:r>
+              <a:rPr lang="fr-FR" sz="2000" dirty="0" err="1"/>
+              <a:t>github</a:t>
+            </a:r>
+            <a:endParaRPr lang="fr-FR" sz="2000" dirty="0"/>
+          </a:p>
+        </p:txBody>
+      </p:sp>
+      <p:sp>
+        <p:nvSpPr>
+          <p:cNvPr id="13" name="Espace réservé du pied de page 12">
+            <a:extLst>
+              <a:ext uri="{FF2B5EF4-FFF2-40B4-BE49-F238E27FC236}">
+                <a16:creationId xmlns:a16="http://schemas.microsoft.com/office/drawing/2014/main" id="{FB82CB81-565F-FA59-F7B2-12C57C27A065}"/>
+              </a:ext>
+            </a:extLst>
+          </p:cNvPr>
+          <p:cNvSpPr>
+            <a:spLocks noGrp="1"/>
+          </p:cNvSpPr>
+          <p:nvPr>
+            <p:ph type="ftr" sz="quarter" idx="11"/>
+          </p:nvPr>
+        </p:nvSpPr>
+        <p:spPr/>
+        <p:txBody>
+          <a:bodyPr/>
+          <a:lstStyle/>
+          <a:p>
+            <a:r>
+              <a:rPr lang="fr-FR" dirty="0"/>
+              <a:t>RSX217</a:t>
+            </a:r>
+            <a:br>
+              <a:rPr lang="fr-FR" dirty="0"/>
+            </a:br>
+            <a:r>
+              <a:rPr lang="fr-FR" dirty="0"/>
+              <a:t>Traffic Engineering in SDN </a:t>
+            </a:r>
+            <a:r>
+              <a:rPr lang="fr-FR" dirty="0" err="1"/>
+              <a:t>Using</a:t>
+            </a:r>
+            <a:r>
+              <a:rPr lang="fr-FR" dirty="0"/>
+              <a:t> </a:t>
+            </a:r>
+            <a:r>
+              <a:rPr lang="fr-FR" dirty="0" err="1"/>
+              <a:t>OpenFlow</a:t>
+            </a:r>
+            <a:r>
+              <a:rPr lang="fr-FR" dirty="0"/>
+              <a:t> </a:t>
+            </a:r>
+          </a:p>
+        </p:txBody>
+      </p:sp>
+      <p:sp>
+        <p:nvSpPr>
+          <p:cNvPr id="15" name="Espace réservé de la date 14">
+            <a:extLst>
+              <a:ext uri="{FF2B5EF4-FFF2-40B4-BE49-F238E27FC236}">
+                <a16:creationId xmlns:a16="http://schemas.microsoft.com/office/drawing/2014/main" id="{0509B32E-629E-13DA-A029-F284E8529D00}"/>
+              </a:ext>
+            </a:extLst>
+          </p:cNvPr>
+          <p:cNvSpPr>
+            <a:spLocks noGrp="1"/>
+          </p:cNvSpPr>
+          <p:nvPr>
+            <p:ph type="dt" sz="half" idx="10"/>
+          </p:nvPr>
+        </p:nvSpPr>
+        <p:spPr/>
+        <p:txBody>
+          <a:bodyPr/>
+          <a:lstStyle/>
+          <a:p>
+            <a:r>
+              <a:rPr lang="fr-FR"/>
+              <a:t>19/12/2024</a:t>
             </a:r>
             <a:endParaRPr lang="fr-FR" dirty="0"/>
+          </a:p>
+        </p:txBody>
+      </p:sp>
+      <p:sp>
+        <p:nvSpPr>
+          <p:cNvPr id="20" name="Espace réservé du numéro de diapositive 16">
+            <a:extLst>
+              <a:ext uri="{FF2B5EF4-FFF2-40B4-BE49-F238E27FC236}">
+                <a16:creationId xmlns:a16="http://schemas.microsoft.com/office/drawing/2014/main" id="{7A78BFE7-CC11-F517-3469-640F5F33FC61}"/>
+              </a:ext>
+            </a:extLst>
+          </p:cNvPr>
+          <p:cNvSpPr txBox="1">
+            <a:spLocks/>
+          </p:cNvSpPr>
+          <p:nvPr/>
+        </p:nvSpPr>
+        <p:spPr>
+          <a:xfrm>
+            <a:off x="9713842" y="6459785"/>
+            <a:ext cx="1498641" cy="365125"/>
+          </a:xfrm>
+          <a:prstGeom prst="rect">
+            <a:avLst/>
+          </a:prstGeom>
+        </p:spPr>
+        <p:txBody>
+          <a:bodyPr vert="horz" lIns="91440" tIns="45720" rIns="91440" bIns="45720" rtlCol="0" anchor="ctr"/>
+          <a:lstStyle>
+            <a:defPPr>
+              <a:defRPr lang="en-US"/>
+            </a:defPPr>
+            <a:lvl1pPr marL="0" algn="r" defTabSz="457200" rtl="0" eaLnBrk="1" latinLnBrk="0" hangingPunct="1">
+              <a:defRPr sz="1050" kern="1200">
+                <a:solidFill>
+                  <a:srgbClr val="FFFFFF"/>
+                </a:solidFill>
+                <a:latin typeface="+mn-lt"/>
+                <a:ea typeface="+mn-ea"/>
+                <a:cs typeface="+mn-cs"/>
+              </a:defRPr>
+            </a:lvl1pPr>
+            <a:lvl2pPr marL="457200" algn="l" defTabSz="457200" rtl="0" eaLnBrk="1" latinLnBrk="0" hangingPunct="1">
+              <a:defRPr sz="1800" kern="1200">
+                <a:solidFill>
+                  <a:schemeClr val="tx1"/>
+                </a:solidFill>
+                <a:latin typeface="+mn-lt"/>
+                <a:ea typeface="+mn-ea"/>
+                <a:cs typeface="+mn-cs"/>
+              </a:defRPr>
+            </a:lvl2pPr>
+            <a:lvl3pPr marL="914400" algn="l" defTabSz="457200" rtl="0" eaLnBrk="1" latinLnBrk="0" hangingPunct="1">
+              <a:defRPr sz="1800" kern="1200">
+                <a:solidFill>
+                  <a:schemeClr val="tx1"/>
+                </a:solidFill>
+                <a:latin typeface="+mn-lt"/>
+                <a:ea typeface="+mn-ea"/>
+                <a:cs typeface="+mn-cs"/>
+              </a:defRPr>
+            </a:lvl3pPr>
+            <a:lvl4pPr marL="1371600" algn="l" defTabSz="457200" rtl="0" eaLnBrk="1" latinLnBrk="0" hangingPunct="1">
+              <a:defRPr sz="1800" kern="1200">
+                <a:solidFill>
+                  <a:schemeClr val="tx1"/>
+                </a:solidFill>
+                <a:latin typeface="+mn-lt"/>
+                <a:ea typeface="+mn-ea"/>
+                <a:cs typeface="+mn-cs"/>
+              </a:defRPr>
+            </a:lvl4pPr>
+            <a:lvl5pPr marL="1828800" algn="l" defTabSz="457200" rtl="0" eaLnBrk="1" latinLnBrk="0" hangingPunct="1">
+              <a:defRPr sz="1800" kern="1200">
+                <a:solidFill>
+                  <a:schemeClr val="tx1"/>
+                </a:solidFill>
+                <a:latin typeface="+mn-lt"/>
+                <a:ea typeface="+mn-ea"/>
+                <a:cs typeface="+mn-cs"/>
+              </a:defRPr>
+            </a:lvl5pPr>
+            <a:lvl6pPr marL="2286000" algn="l" defTabSz="457200" rtl="0" eaLnBrk="1" latinLnBrk="0" hangingPunct="1">
+              <a:defRPr sz="1800" kern="1200">
+                <a:solidFill>
+                  <a:schemeClr val="tx1"/>
+                </a:solidFill>
+                <a:latin typeface="+mn-lt"/>
+                <a:ea typeface="+mn-ea"/>
+                <a:cs typeface="+mn-cs"/>
+              </a:defRPr>
+            </a:lvl6pPr>
+            <a:lvl7pPr marL="2743200" algn="l" defTabSz="457200" rtl="0" eaLnBrk="1" latinLnBrk="0" hangingPunct="1">
+              <a:defRPr sz="1800" kern="1200">
+                <a:solidFill>
+                  <a:schemeClr val="tx1"/>
+                </a:solidFill>
+                <a:latin typeface="+mn-lt"/>
+                <a:ea typeface="+mn-ea"/>
+                <a:cs typeface="+mn-cs"/>
+              </a:defRPr>
+            </a:lvl7pPr>
+            <a:lvl8pPr marL="3200400" algn="l" defTabSz="457200" rtl="0" eaLnBrk="1" latinLnBrk="0" hangingPunct="1">
+              <a:defRPr sz="1800" kern="1200">
+                <a:solidFill>
+                  <a:schemeClr val="tx1"/>
+                </a:solidFill>
+                <a:latin typeface="+mn-lt"/>
+                <a:ea typeface="+mn-ea"/>
+                <a:cs typeface="+mn-cs"/>
+              </a:defRPr>
+            </a:lvl8pPr>
+            <a:lvl9pPr marL="3657600" algn="l" defTabSz="457200" rtl="0" eaLnBrk="1" latinLnBrk="0" hangingPunct="1">
+              <a:defRPr sz="1800" kern="1200">
+                <a:solidFill>
+                  <a:schemeClr val="tx1"/>
+                </a:solidFill>
+                <a:latin typeface="+mn-lt"/>
+                <a:ea typeface="+mn-ea"/>
+                <a:cs typeface="+mn-cs"/>
+              </a:defRPr>
+            </a:lvl9pPr>
+          </a:lstStyle>
+          <a:p>
+            <a:r>
+              <a:rPr lang="fr-FR" dirty="0"/>
+              <a:t>Jouve G., Martin A., Maire O., </a:t>
+            </a:r>
+            <a:r>
+              <a:rPr lang="fr-FR" dirty="0" err="1"/>
+              <a:t>Carlucci</a:t>
+            </a:r>
+            <a:r>
+              <a:rPr lang="fr-FR" dirty="0"/>
+              <a:t> </a:t>
+            </a:r>
+            <a:r>
+              <a:rPr lang="fr-FR" dirty="0" err="1"/>
+              <a:t>T</a:t>
+            </a:r>
+            <a:r>
+              <a:rPr lang="fr-FR" dirty="0"/>
+              <a:t>.</a:t>
+            </a:r>
           </a:p>
         </p:txBody>
       </p:sp>
     </p:spTree>
     <p:extLst>
       <p:ext uri="{BB962C8B-B14F-4D97-AF65-F5344CB8AC3E}">
-        <p14:creationId xmlns:p14="http://schemas.microsoft.com/office/powerpoint/2010/main" val="3572246728"/>
+        <p14:creationId xmlns:p14="http://schemas.microsoft.com/office/powerpoint/2010/main" val="3513204114"/>
       </p:ext>
     </p:extLst>
   </p:cSld>
@@ -4995,7 +5296,7 @@
           <p:cNvPr id="2" name="Titre 1">
             <a:extLst>
               <a:ext uri="{FF2B5EF4-FFF2-40B4-BE49-F238E27FC236}">
-                <a16:creationId xmlns:a16="http://schemas.microsoft.com/office/drawing/2014/main" id="{7C163BA1-EA14-4132-EC26-BEE79038FA44}"/>
+                <a16:creationId xmlns:a16="http://schemas.microsoft.com/office/drawing/2014/main" id="{7F88D680-1DDE-5C04-3730-1F70CE67607A}"/>
               </a:ext>
             </a:extLst>
           </p:cNvPr>
@@ -5014,17 +5315,17 @@
             <a:pPr algn="ctr"/>
             <a:r>
               <a:rPr lang="fr-FR" dirty="0"/>
-              <a:t>Préparation de l’environnement (1/2)</a:t>
-            </a:r>
-          </a:p>
-        </p:txBody>
-      </p:sp>
-      <p:sp>
-        <p:nvSpPr>
-          <p:cNvPr id="4" name="Espace réservé du numéro de diapositive 3">
+              <a:t>Difficultés</a:t>
+            </a:r>
+          </a:p>
+        </p:txBody>
+      </p:sp>
+      <p:sp>
+        <p:nvSpPr>
+          <p:cNvPr id="3" name="Espace réservé du pied de page 2">
             <a:extLst>
               <a:ext uri="{FF2B5EF4-FFF2-40B4-BE49-F238E27FC236}">
-                <a16:creationId xmlns:a16="http://schemas.microsoft.com/office/drawing/2014/main" id="{EC198689-701C-D769-14F0-F2707E65F02D}"/>
+                <a16:creationId xmlns:a16="http://schemas.microsoft.com/office/drawing/2014/main" id="{6D04E969-3CF2-AD69-9678-F03AE62E5BFC}"/>
               </a:ext>
             </a:extLst>
           </p:cNvPr>
@@ -5032,7 +5333,7 @@
             <a:spLocks noGrp="1"/>
           </p:cNvSpPr>
           <p:nvPr>
-            <p:ph type="sldNum" sz="quarter" idx="12"/>
+            <p:ph type="ftr" sz="quarter" idx="11"/>
           </p:nvPr>
         </p:nvSpPr>
         <p:spPr/>
@@ -5040,100 +5341,212 @@
           <a:bodyPr/>
           <a:lstStyle/>
           <a:p>
-            <a:fld id="{DC2E16F3-7CBC-431B-A389-3AC051105C99}" type="slidenum">
-              <a:rPr lang="fr-FR" smtClean="0"/>
-              <a:t>2</a:t>
-            </a:fld>
-            <a:endParaRPr lang="fr-FR"/>
-          </a:p>
-        </p:txBody>
-      </p:sp>
-      <p:sp>
-        <p:nvSpPr>
-          <p:cNvPr id="3" name="ZoneTexte 2">
+            <a:r>
+              <a:rPr lang="fr-FR" dirty="0"/>
+              <a:t>RSX217</a:t>
+            </a:r>
+            <a:br>
+              <a:rPr lang="fr-FR" dirty="0"/>
+            </a:br>
+            <a:r>
+              <a:rPr lang="fr-FR" dirty="0"/>
+              <a:t>Traffic Engineering in SDN </a:t>
+            </a:r>
+            <a:r>
+              <a:rPr lang="fr-FR" dirty="0" err="1"/>
+              <a:t>Using</a:t>
+            </a:r>
+            <a:r>
+              <a:rPr lang="fr-FR" dirty="0"/>
+              <a:t> </a:t>
+            </a:r>
+            <a:r>
+              <a:rPr lang="fr-FR" dirty="0" err="1"/>
+              <a:t>OpenFlow</a:t>
+            </a:r>
+            <a:r>
+              <a:rPr lang="fr-FR" dirty="0"/>
+              <a:t> </a:t>
+            </a:r>
+          </a:p>
+        </p:txBody>
+      </p:sp>
+      <p:sp>
+        <p:nvSpPr>
+          <p:cNvPr id="5" name="Espace réservé de la date 4">
             <a:extLst>
               <a:ext uri="{FF2B5EF4-FFF2-40B4-BE49-F238E27FC236}">
-                <a16:creationId xmlns:a16="http://schemas.microsoft.com/office/drawing/2014/main" id="{A8D2952B-24C8-C36C-DDEB-A60B6602BDBA}"/>
+                <a16:creationId xmlns:a16="http://schemas.microsoft.com/office/drawing/2014/main" id="{32F61709-4A64-A2C6-AAFB-3B300728E1C6}"/>
               </a:ext>
             </a:extLst>
           </p:cNvPr>
-          <p:cNvSpPr txBox="1"/>
+          <p:cNvSpPr>
+            <a:spLocks noGrp="1"/>
+          </p:cNvSpPr>
+          <p:nvPr>
+            <p:ph type="dt" sz="half" idx="10"/>
+          </p:nvPr>
+        </p:nvSpPr>
+        <p:spPr/>
+        <p:txBody>
+          <a:bodyPr/>
+          <a:lstStyle/>
+          <a:p>
+            <a:r>
+              <a:rPr lang="fr-FR"/>
+              <a:t>19/12/2024</a:t>
+            </a:r>
+          </a:p>
+        </p:txBody>
+      </p:sp>
+      <p:sp>
+        <p:nvSpPr>
+          <p:cNvPr id="7" name="Espace réservé du numéro de diapositive 16">
+            <a:extLst>
+              <a:ext uri="{FF2B5EF4-FFF2-40B4-BE49-F238E27FC236}">
+                <a16:creationId xmlns:a16="http://schemas.microsoft.com/office/drawing/2014/main" id="{88DD0204-DB1E-2D4A-630C-E278752DE1B9}"/>
+              </a:ext>
+            </a:extLst>
+          </p:cNvPr>
+          <p:cNvSpPr txBox="1">
+            <a:spLocks/>
+          </p:cNvSpPr>
           <p:nvPr/>
         </p:nvSpPr>
         <p:spPr>
           <a:xfrm>
-            <a:off x="1703540" y="2141951"/>
-            <a:ext cx="8906005" cy="2831544"/>
+            <a:off x="9660836" y="6459785"/>
+            <a:ext cx="1551648" cy="365125"/>
           </a:xfrm>
           <a:prstGeom prst="rect">
             <a:avLst/>
           </a:prstGeom>
-          <a:noFill/>
         </p:spPr>
         <p:txBody>
-          <a:bodyPr wrap="square" rtlCol="0">
-            <a:spAutoFit/>
-          </a:bodyPr>
-          <a:lstStyle/>
-          <a:p>
-            <a:pPr marL="285750" indent="-285750">
-              <a:buFont typeface="Arial" panose="020B0604020202020204" pitchFamily="34" charset="0"/>
-              <a:buChar char="•"/>
-            </a:pPr>
-            <a:r>
-              <a:rPr lang="fr-FR" sz="3200" dirty="0"/>
-              <a:t>Organisation</a:t>
-            </a:r>
-          </a:p>
-          <a:p>
-            <a:pPr marL="742950" lvl="1" indent="-285750">
-              <a:buFont typeface="Arial" panose="020B0604020202020204" pitchFamily="34" charset="0"/>
-              <a:buChar char="•"/>
-            </a:pPr>
-            <a:r>
-              <a:rPr lang="fr-FR" sz="3200" dirty="0"/>
-              <a:t>Utilisation de planner (à faire , en cours, fait)</a:t>
-            </a:r>
-          </a:p>
-          <a:p>
-            <a:pPr marL="742950" lvl="1" indent="-285750">
-              <a:buFont typeface="Arial" panose="020B0604020202020204" pitchFamily="34" charset="0"/>
-              <a:buChar char="•"/>
-            </a:pPr>
-            <a:r>
-              <a:rPr lang="fr-FR" sz="3200" dirty="0"/>
-              <a:t>Création équipe teams</a:t>
-            </a:r>
-          </a:p>
-          <a:p>
-            <a:pPr marL="742950" lvl="1" indent="-285750">
-              <a:buFont typeface="Arial" panose="020B0604020202020204" pitchFamily="34" charset="0"/>
-              <a:buChar char="•"/>
-            </a:pPr>
-            <a:r>
-              <a:rPr lang="fr-FR" sz="3200" dirty="0"/>
-              <a:t> Visio teams réguliers</a:t>
-            </a:r>
-          </a:p>
-          <a:p>
-            <a:pPr marL="742950" lvl="1" indent="-285750">
-              <a:buFont typeface="Arial" panose="020B0604020202020204" pitchFamily="34" charset="0"/>
-              <a:buChar char="•"/>
-            </a:pPr>
-            <a:r>
-              <a:rPr lang="fr-FR" sz="3200" dirty="0"/>
-              <a:t>Echanges par chat team asynchrones</a:t>
-            </a:r>
-          </a:p>
-          <a:p>
-            <a:endParaRPr lang="fr-FR" dirty="0"/>
+          <a:bodyPr vert="horz" lIns="91440" tIns="45720" rIns="91440" bIns="45720" rtlCol="0" anchor="ctr"/>
+          <a:lstStyle>
+            <a:defPPr>
+              <a:defRPr lang="en-US"/>
+            </a:defPPr>
+            <a:lvl1pPr marL="0" algn="r" defTabSz="457200" rtl="0" eaLnBrk="1" latinLnBrk="0" hangingPunct="1">
+              <a:defRPr sz="1050" kern="1200">
+                <a:solidFill>
+                  <a:srgbClr val="FFFFFF"/>
+                </a:solidFill>
+                <a:latin typeface="+mn-lt"/>
+                <a:ea typeface="+mn-ea"/>
+                <a:cs typeface="+mn-cs"/>
+              </a:defRPr>
+            </a:lvl1pPr>
+            <a:lvl2pPr marL="457200" algn="l" defTabSz="457200" rtl="0" eaLnBrk="1" latinLnBrk="0" hangingPunct="1">
+              <a:defRPr sz="1800" kern="1200">
+                <a:solidFill>
+                  <a:schemeClr val="tx1"/>
+                </a:solidFill>
+                <a:latin typeface="+mn-lt"/>
+                <a:ea typeface="+mn-ea"/>
+                <a:cs typeface="+mn-cs"/>
+              </a:defRPr>
+            </a:lvl2pPr>
+            <a:lvl3pPr marL="914400" algn="l" defTabSz="457200" rtl="0" eaLnBrk="1" latinLnBrk="0" hangingPunct="1">
+              <a:defRPr sz="1800" kern="1200">
+                <a:solidFill>
+                  <a:schemeClr val="tx1"/>
+                </a:solidFill>
+                <a:latin typeface="+mn-lt"/>
+                <a:ea typeface="+mn-ea"/>
+                <a:cs typeface="+mn-cs"/>
+              </a:defRPr>
+            </a:lvl3pPr>
+            <a:lvl4pPr marL="1371600" algn="l" defTabSz="457200" rtl="0" eaLnBrk="1" latinLnBrk="0" hangingPunct="1">
+              <a:defRPr sz="1800" kern="1200">
+                <a:solidFill>
+                  <a:schemeClr val="tx1"/>
+                </a:solidFill>
+                <a:latin typeface="+mn-lt"/>
+                <a:ea typeface="+mn-ea"/>
+                <a:cs typeface="+mn-cs"/>
+              </a:defRPr>
+            </a:lvl4pPr>
+            <a:lvl5pPr marL="1828800" algn="l" defTabSz="457200" rtl="0" eaLnBrk="1" latinLnBrk="0" hangingPunct="1">
+              <a:defRPr sz="1800" kern="1200">
+                <a:solidFill>
+                  <a:schemeClr val="tx1"/>
+                </a:solidFill>
+                <a:latin typeface="+mn-lt"/>
+                <a:ea typeface="+mn-ea"/>
+                <a:cs typeface="+mn-cs"/>
+              </a:defRPr>
+            </a:lvl5pPr>
+            <a:lvl6pPr marL="2286000" algn="l" defTabSz="457200" rtl="0" eaLnBrk="1" latinLnBrk="0" hangingPunct="1">
+              <a:defRPr sz="1800" kern="1200">
+                <a:solidFill>
+                  <a:schemeClr val="tx1"/>
+                </a:solidFill>
+                <a:latin typeface="+mn-lt"/>
+                <a:ea typeface="+mn-ea"/>
+                <a:cs typeface="+mn-cs"/>
+              </a:defRPr>
+            </a:lvl6pPr>
+            <a:lvl7pPr marL="2743200" algn="l" defTabSz="457200" rtl="0" eaLnBrk="1" latinLnBrk="0" hangingPunct="1">
+              <a:defRPr sz="1800" kern="1200">
+                <a:solidFill>
+                  <a:schemeClr val="tx1"/>
+                </a:solidFill>
+                <a:latin typeface="+mn-lt"/>
+                <a:ea typeface="+mn-ea"/>
+                <a:cs typeface="+mn-cs"/>
+              </a:defRPr>
+            </a:lvl7pPr>
+            <a:lvl8pPr marL="3200400" algn="l" defTabSz="457200" rtl="0" eaLnBrk="1" latinLnBrk="0" hangingPunct="1">
+              <a:defRPr sz="1800" kern="1200">
+                <a:solidFill>
+                  <a:schemeClr val="tx1"/>
+                </a:solidFill>
+                <a:latin typeface="+mn-lt"/>
+                <a:ea typeface="+mn-ea"/>
+                <a:cs typeface="+mn-cs"/>
+              </a:defRPr>
+            </a:lvl8pPr>
+            <a:lvl9pPr marL="3657600" algn="l" defTabSz="457200" rtl="0" eaLnBrk="1" latinLnBrk="0" hangingPunct="1">
+              <a:defRPr sz="1800" kern="1200">
+                <a:solidFill>
+                  <a:schemeClr val="tx1"/>
+                </a:solidFill>
+                <a:latin typeface="+mn-lt"/>
+                <a:ea typeface="+mn-ea"/>
+                <a:cs typeface="+mn-cs"/>
+              </a:defRPr>
+            </a:lvl9pPr>
+          </a:lstStyle>
+          <a:p>
+            <a:r>
+              <a:rPr lang="fr-FR" dirty="0"/>
+              <a:t>Jouve G., Martin A., Maire O., </a:t>
+            </a:r>
+            <a:r>
+              <a:rPr lang="fr-FR" dirty="0" err="1"/>
+              <a:t>Carlucci</a:t>
+            </a:r>
+            <a:r>
+              <a:rPr lang="fr-FR" dirty="0"/>
+              <a:t> </a:t>
+            </a:r>
+            <a:r>
+              <a:rPr lang="fr-FR" dirty="0" err="1"/>
+              <a:t>T</a:t>
+            </a:r>
+            <a:r>
+              <a:rPr lang="fr-FR" dirty="0"/>
+              <a:t>.</a:t>
+            </a:r>
           </a:p>
         </p:txBody>
       </p:sp>
     </p:spTree>
     <p:extLst>
       <p:ext uri="{BB962C8B-B14F-4D97-AF65-F5344CB8AC3E}">
-        <p14:creationId xmlns:p14="http://schemas.microsoft.com/office/powerpoint/2010/main" val="3513204114"/>
+        <p14:creationId xmlns:p14="http://schemas.microsoft.com/office/powerpoint/2010/main" val="484856700"/>
       </p:ext>
     </p:extLst>
   </p:cSld>
@@ -5165,7 +5578,7 @@
           <p:cNvPr id="2" name="Titre 1">
             <a:extLst>
               <a:ext uri="{FF2B5EF4-FFF2-40B4-BE49-F238E27FC236}">
-                <a16:creationId xmlns:a16="http://schemas.microsoft.com/office/drawing/2014/main" id="{7C163BA1-EA14-4132-EC26-BEE79038FA44}"/>
+                <a16:creationId xmlns:a16="http://schemas.microsoft.com/office/drawing/2014/main" id="{7F88D680-1DDE-5C04-3730-1F70CE67607A}"/>
               </a:ext>
             </a:extLst>
           </p:cNvPr>
@@ -5184,17 +5597,17 @@
             <a:pPr algn="ctr"/>
             <a:r>
               <a:rPr lang="fr-FR" dirty="0"/>
-              <a:t>Préparation de l’environnement (2/2)</a:t>
-            </a:r>
-          </a:p>
-        </p:txBody>
-      </p:sp>
-      <p:sp>
-        <p:nvSpPr>
-          <p:cNvPr id="4" name="Espace réservé du numéro de diapositive 3">
+              <a:t>Prochaines étapes</a:t>
+            </a:r>
+          </a:p>
+        </p:txBody>
+      </p:sp>
+      <p:sp>
+        <p:nvSpPr>
+          <p:cNvPr id="3" name="Espace réservé du pied de page 2">
             <a:extLst>
               <a:ext uri="{FF2B5EF4-FFF2-40B4-BE49-F238E27FC236}">
-                <a16:creationId xmlns:a16="http://schemas.microsoft.com/office/drawing/2014/main" id="{EC198689-701C-D769-14F0-F2707E65F02D}"/>
+                <a16:creationId xmlns:a16="http://schemas.microsoft.com/office/drawing/2014/main" id="{BBA7B995-EBF4-C486-4A93-C751C616AA01}"/>
               </a:ext>
             </a:extLst>
           </p:cNvPr>
@@ -5202,7 +5615,7 @@
             <a:spLocks noGrp="1"/>
           </p:cNvSpPr>
           <p:nvPr>
-            <p:ph type="sldNum" sz="quarter" idx="12"/>
+            <p:ph type="ftr" sz="quarter" idx="11"/>
           </p:nvPr>
         </p:nvSpPr>
         <p:spPr/>
@@ -5210,280 +5623,205 @@
           <a:bodyPr/>
           <a:lstStyle/>
           <a:p>
-            <a:fld id="{DC2E16F3-7CBC-431B-A389-3AC051105C99}" type="slidenum">
-              <a:rPr lang="fr-FR" smtClean="0"/>
-              <a:t>3</a:t>
-            </a:fld>
-            <a:endParaRPr lang="fr-FR"/>
-          </a:p>
-        </p:txBody>
-      </p:sp>
-      <p:sp>
-        <p:nvSpPr>
-          <p:cNvPr id="3" name="ZoneTexte 2">
+            <a:r>
+              <a:rPr lang="fr-FR" dirty="0"/>
+              <a:t>RSX217</a:t>
+            </a:r>
+            <a:br>
+              <a:rPr lang="fr-FR" dirty="0"/>
+            </a:br>
+            <a:r>
+              <a:rPr lang="fr-FR" dirty="0"/>
+              <a:t>Traffic Engineering in SDN </a:t>
+            </a:r>
+            <a:r>
+              <a:rPr lang="fr-FR" dirty="0" err="1"/>
+              <a:t>Using</a:t>
+            </a:r>
+            <a:r>
+              <a:rPr lang="fr-FR" dirty="0"/>
+              <a:t> </a:t>
+            </a:r>
+            <a:r>
+              <a:rPr lang="fr-FR" dirty="0" err="1"/>
+              <a:t>OpenFlow</a:t>
+            </a:r>
+            <a:r>
+              <a:rPr lang="fr-FR" dirty="0"/>
+              <a:t> </a:t>
+            </a:r>
+          </a:p>
+        </p:txBody>
+      </p:sp>
+      <p:sp>
+        <p:nvSpPr>
+          <p:cNvPr id="5" name="Espace réservé de la date 4">
             <a:extLst>
               <a:ext uri="{FF2B5EF4-FFF2-40B4-BE49-F238E27FC236}">
-                <a16:creationId xmlns:a16="http://schemas.microsoft.com/office/drawing/2014/main" id="{528CCF0A-2AD1-D0BC-508E-4E0E7573185F}"/>
+                <a16:creationId xmlns:a16="http://schemas.microsoft.com/office/drawing/2014/main" id="{ACB7B6DA-FB7B-0465-4D33-B0C145543DF2}"/>
               </a:ext>
             </a:extLst>
           </p:cNvPr>
-          <p:cNvSpPr txBox="1"/>
+          <p:cNvSpPr>
+            <a:spLocks noGrp="1"/>
+          </p:cNvSpPr>
+          <p:nvPr>
+            <p:ph type="dt" sz="half" idx="10"/>
+          </p:nvPr>
+        </p:nvSpPr>
+        <p:spPr/>
+        <p:txBody>
+          <a:bodyPr/>
+          <a:lstStyle/>
+          <a:p>
+            <a:r>
+              <a:rPr lang="fr-FR"/>
+              <a:t>19/12/2024</a:t>
+            </a:r>
+          </a:p>
+        </p:txBody>
+      </p:sp>
+      <p:sp>
+        <p:nvSpPr>
+          <p:cNvPr id="7" name="Espace réservé du numéro de diapositive 16">
+            <a:extLst>
+              <a:ext uri="{FF2B5EF4-FFF2-40B4-BE49-F238E27FC236}">
+                <a16:creationId xmlns:a16="http://schemas.microsoft.com/office/drawing/2014/main" id="{97F49803-273C-1D2A-5074-FE9A277BB52C}"/>
+              </a:ext>
+            </a:extLst>
+          </p:cNvPr>
+          <p:cNvSpPr txBox="1">
+            <a:spLocks/>
+          </p:cNvSpPr>
           <p:nvPr/>
         </p:nvSpPr>
         <p:spPr>
           <a:xfrm>
-            <a:off x="1703540" y="2141951"/>
-            <a:ext cx="8906005" cy="2831544"/>
+            <a:off x="9660836" y="6459785"/>
+            <a:ext cx="1551648" cy="365125"/>
           </a:xfrm>
           <a:prstGeom prst="rect">
             <a:avLst/>
           </a:prstGeom>
-          <a:noFill/>
         </p:spPr>
         <p:txBody>
-          <a:bodyPr wrap="square" rtlCol="0">
-            <a:spAutoFit/>
-          </a:bodyPr>
-          <a:lstStyle/>
-          <a:p>
-            <a:pPr marL="285750" indent="-285750">
-              <a:buFont typeface="Arial" panose="020B0604020202020204" pitchFamily="34" charset="0"/>
-              <a:buChar char="•"/>
-            </a:pPr>
-            <a:r>
-              <a:rPr lang="fr-FR" sz="3200" dirty="0"/>
-              <a:t>Outils</a:t>
-            </a:r>
-          </a:p>
-          <a:p>
-            <a:pPr marL="742950" lvl="1" indent="-285750">
-              <a:buFont typeface="Arial" panose="020B0604020202020204" pitchFamily="34" charset="0"/>
-              <a:buChar char="•"/>
-            </a:pPr>
-            <a:r>
-              <a:rPr lang="fr-FR" sz="3200" dirty="0"/>
-              <a:t>VM guacamole</a:t>
-            </a:r>
-          </a:p>
-          <a:p>
-            <a:pPr marL="1200150" lvl="2" indent="-285750">
-              <a:buFont typeface="Arial" panose="020B0604020202020204" pitchFamily="34" charset="0"/>
-              <a:buChar char="•"/>
-            </a:pPr>
-            <a:r>
-              <a:rPr lang="fr-FR" sz="3200" dirty="0"/>
-              <a:t>Update python</a:t>
-            </a:r>
-          </a:p>
-          <a:p>
-            <a:pPr marL="1200150" lvl="2" indent="-285750">
-              <a:buFont typeface="Arial" panose="020B0604020202020204" pitchFamily="34" charset="0"/>
-              <a:buChar char="•"/>
-            </a:pPr>
-            <a:r>
-              <a:rPr lang="fr-FR" sz="3200" dirty="0"/>
-              <a:t>Update </a:t>
-            </a:r>
-            <a:r>
-              <a:rPr lang="fr-FR" sz="3200" dirty="0" err="1"/>
-              <a:t>mininet</a:t>
-            </a:r>
-            <a:endParaRPr lang="fr-FR" sz="3200" dirty="0"/>
-          </a:p>
-          <a:p>
-            <a:pPr marL="742950" lvl="1" indent="-285750">
-              <a:buFont typeface="Arial" panose="020B0604020202020204" pitchFamily="34" charset="0"/>
-              <a:buChar char="•"/>
-            </a:pPr>
-            <a:r>
-              <a:rPr lang="fr-FR" sz="3200" dirty="0"/>
-              <a:t>Création projet privé </a:t>
-            </a:r>
-            <a:r>
-              <a:rPr lang="fr-FR" sz="3200" dirty="0" err="1"/>
-              <a:t>github</a:t>
-            </a:r>
-            <a:endParaRPr lang="fr-FR" sz="3200" dirty="0"/>
-          </a:p>
-          <a:p>
-            <a:pPr lvl="1"/>
-            <a:endParaRPr lang="fr-FR" dirty="0"/>
-          </a:p>
-        </p:txBody>
-      </p:sp>
-    </p:spTree>
-    <p:extLst>
-      <p:ext uri="{BB962C8B-B14F-4D97-AF65-F5344CB8AC3E}">
-        <p14:creationId xmlns:p14="http://schemas.microsoft.com/office/powerpoint/2010/main" val="2874770147"/>
-      </p:ext>
-    </p:extLst>
-  </p:cSld>
-  <p:clrMapOvr>
-    <a:masterClrMapping/>
-  </p:clrMapOvr>
-</p:sld>
-</file>
-
-<file path=ppt/slides/slide4.xml><?xml version="1.0" encoding="utf-8"?>
-<p:sld xmlns:a="http://schemas.openxmlformats.org/drawingml/2006/main" xmlns:r="http://schemas.openxmlformats.org/officeDocument/2006/relationships" xmlns:p="http://schemas.openxmlformats.org/presentationml/2006/main">
-  <p:cSld>
-    <p:spTree>
-      <p:nvGrpSpPr>
-        <p:cNvPr id="1" name=""/>
-        <p:cNvGrpSpPr/>
-        <p:nvPr/>
-      </p:nvGrpSpPr>
-      <p:grpSpPr>
-        <a:xfrm>
-          <a:off x="0" y="0"/>
-          <a:ext cx="0" cy="0"/>
-          <a:chOff x="0" y="0"/>
-          <a:chExt cx="0" cy="0"/>
-        </a:xfrm>
-      </p:grpSpPr>
-      <p:sp>
-        <p:nvSpPr>
-          <p:cNvPr id="2" name="Titre 1">
-            <a:extLst>
-              <a:ext uri="{FF2B5EF4-FFF2-40B4-BE49-F238E27FC236}">
-                <a16:creationId xmlns:a16="http://schemas.microsoft.com/office/drawing/2014/main" id="{7F88D680-1DDE-5C04-3730-1F70CE67607A}"/>
-              </a:ext>
-            </a:extLst>
-          </p:cNvPr>
-          <p:cNvSpPr>
-            <a:spLocks noGrp="1"/>
-          </p:cNvSpPr>
-          <p:nvPr>
-            <p:ph type="title"/>
-          </p:nvPr>
-        </p:nvSpPr>
-        <p:spPr/>
-        <p:txBody>
-          <a:bodyPr/>
-          <a:lstStyle/>
-          <a:p>
-            <a:pPr algn="ctr"/>
+          <a:bodyPr vert="horz" lIns="91440" tIns="45720" rIns="91440" bIns="45720" rtlCol="0" anchor="ctr"/>
+          <a:lstStyle>
+            <a:defPPr>
+              <a:defRPr lang="en-US"/>
+            </a:defPPr>
+            <a:lvl1pPr marL="0" algn="r" defTabSz="457200" rtl="0" eaLnBrk="1" latinLnBrk="0" hangingPunct="1">
+              <a:defRPr sz="1050" kern="1200">
+                <a:solidFill>
+                  <a:srgbClr val="FFFFFF"/>
+                </a:solidFill>
+                <a:latin typeface="+mn-lt"/>
+                <a:ea typeface="+mn-ea"/>
+                <a:cs typeface="+mn-cs"/>
+              </a:defRPr>
+            </a:lvl1pPr>
+            <a:lvl2pPr marL="457200" algn="l" defTabSz="457200" rtl="0" eaLnBrk="1" latinLnBrk="0" hangingPunct="1">
+              <a:defRPr sz="1800" kern="1200">
+                <a:solidFill>
+                  <a:schemeClr val="tx1"/>
+                </a:solidFill>
+                <a:latin typeface="+mn-lt"/>
+                <a:ea typeface="+mn-ea"/>
+                <a:cs typeface="+mn-cs"/>
+              </a:defRPr>
+            </a:lvl2pPr>
+            <a:lvl3pPr marL="914400" algn="l" defTabSz="457200" rtl="0" eaLnBrk="1" latinLnBrk="0" hangingPunct="1">
+              <a:defRPr sz="1800" kern="1200">
+                <a:solidFill>
+                  <a:schemeClr val="tx1"/>
+                </a:solidFill>
+                <a:latin typeface="+mn-lt"/>
+                <a:ea typeface="+mn-ea"/>
+                <a:cs typeface="+mn-cs"/>
+              </a:defRPr>
+            </a:lvl3pPr>
+            <a:lvl4pPr marL="1371600" algn="l" defTabSz="457200" rtl="0" eaLnBrk="1" latinLnBrk="0" hangingPunct="1">
+              <a:defRPr sz="1800" kern="1200">
+                <a:solidFill>
+                  <a:schemeClr val="tx1"/>
+                </a:solidFill>
+                <a:latin typeface="+mn-lt"/>
+                <a:ea typeface="+mn-ea"/>
+                <a:cs typeface="+mn-cs"/>
+              </a:defRPr>
+            </a:lvl4pPr>
+            <a:lvl5pPr marL="1828800" algn="l" defTabSz="457200" rtl="0" eaLnBrk="1" latinLnBrk="0" hangingPunct="1">
+              <a:defRPr sz="1800" kern="1200">
+                <a:solidFill>
+                  <a:schemeClr val="tx1"/>
+                </a:solidFill>
+                <a:latin typeface="+mn-lt"/>
+                <a:ea typeface="+mn-ea"/>
+                <a:cs typeface="+mn-cs"/>
+              </a:defRPr>
+            </a:lvl5pPr>
+            <a:lvl6pPr marL="2286000" algn="l" defTabSz="457200" rtl="0" eaLnBrk="1" latinLnBrk="0" hangingPunct="1">
+              <a:defRPr sz="1800" kern="1200">
+                <a:solidFill>
+                  <a:schemeClr val="tx1"/>
+                </a:solidFill>
+                <a:latin typeface="+mn-lt"/>
+                <a:ea typeface="+mn-ea"/>
+                <a:cs typeface="+mn-cs"/>
+              </a:defRPr>
+            </a:lvl6pPr>
+            <a:lvl7pPr marL="2743200" algn="l" defTabSz="457200" rtl="0" eaLnBrk="1" latinLnBrk="0" hangingPunct="1">
+              <a:defRPr sz="1800" kern="1200">
+                <a:solidFill>
+                  <a:schemeClr val="tx1"/>
+                </a:solidFill>
+                <a:latin typeface="+mn-lt"/>
+                <a:ea typeface="+mn-ea"/>
+                <a:cs typeface="+mn-cs"/>
+              </a:defRPr>
+            </a:lvl7pPr>
+            <a:lvl8pPr marL="3200400" algn="l" defTabSz="457200" rtl="0" eaLnBrk="1" latinLnBrk="0" hangingPunct="1">
+              <a:defRPr sz="1800" kern="1200">
+                <a:solidFill>
+                  <a:schemeClr val="tx1"/>
+                </a:solidFill>
+                <a:latin typeface="+mn-lt"/>
+                <a:ea typeface="+mn-ea"/>
+                <a:cs typeface="+mn-cs"/>
+              </a:defRPr>
+            </a:lvl8pPr>
+            <a:lvl9pPr marL="3657600" algn="l" defTabSz="457200" rtl="0" eaLnBrk="1" latinLnBrk="0" hangingPunct="1">
+              <a:defRPr sz="1800" kern="1200">
+                <a:solidFill>
+                  <a:schemeClr val="tx1"/>
+                </a:solidFill>
+                <a:latin typeface="+mn-lt"/>
+                <a:ea typeface="+mn-ea"/>
+                <a:cs typeface="+mn-cs"/>
+              </a:defRPr>
+            </a:lvl9pPr>
+          </a:lstStyle>
+          <a:p>
             <a:r>
               <a:rPr lang="fr-FR" dirty="0"/>
-              <a:t>Difficultés</a:t>
-            </a:r>
-          </a:p>
-        </p:txBody>
-      </p:sp>
-      <p:sp>
-        <p:nvSpPr>
-          <p:cNvPr id="4" name="Espace réservé du numéro de diapositive 3">
-            <a:extLst>
-              <a:ext uri="{FF2B5EF4-FFF2-40B4-BE49-F238E27FC236}">
-                <a16:creationId xmlns:a16="http://schemas.microsoft.com/office/drawing/2014/main" id="{2D48D084-C594-67B8-AB74-489B24D8ECF5}"/>
-              </a:ext>
-            </a:extLst>
-          </p:cNvPr>
-          <p:cNvSpPr>
-            <a:spLocks noGrp="1"/>
-          </p:cNvSpPr>
-          <p:nvPr>
-            <p:ph type="sldNum" sz="quarter" idx="12"/>
-          </p:nvPr>
-        </p:nvSpPr>
-        <p:spPr/>
-        <p:txBody>
-          <a:bodyPr/>
-          <a:lstStyle/>
-          <a:p>
-            <a:fld id="{DC2E16F3-7CBC-431B-A389-3AC051105C99}" type="slidenum">
-              <a:rPr lang="fr-FR" smtClean="0"/>
-              <a:t>4</a:t>
-            </a:fld>
-            <a:endParaRPr lang="fr-FR"/>
-          </a:p>
-        </p:txBody>
-      </p:sp>
-    </p:spTree>
-    <p:extLst>
-      <p:ext uri="{BB962C8B-B14F-4D97-AF65-F5344CB8AC3E}">
-        <p14:creationId xmlns:p14="http://schemas.microsoft.com/office/powerpoint/2010/main" val="484856700"/>
-      </p:ext>
-    </p:extLst>
-  </p:cSld>
-  <p:clrMapOvr>
-    <a:masterClrMapping/>
-  </p:clrMapOvr>
-</p:sld>
-</file>
-
-<file path=ppt/slides/slide5.xml><?xml version="1.0" encoding="utf-8"?>
-<p:sld xmlns:a="http://schemas.openxmlformats.org/drawingml/2006/main" xmlns:r="http://schemas.openxmlformats.org/officeDocument/2006/relationships" xmlns:p="http://schemas.openxmlformats.org/presentationml/2006/main">
-  <p:cSld>
-    <p:spTree>
-      <p:nvGrpSpPr>
-        <p:cNvPr id="1" name=""/>
-        <p:cNvGrpSpPr/>
-        <p:nvPr/>
-      </p:nvGrpSpPr>
-      <p:grpSpPr>
-        <a:xfrm>
-          <a:off x="0" y="0"/>
-          <a:ext cx="0" cy="0"/>
-          <a:chOff x="0" y="0"/>
-          <a:chExt cx="0" cy="0"/>
-        </a:xfrm>
-      </p:grpSpPr>
-      <p:sp>
-        <p:nvSpPr>
-          <p:cNvPr id="2" name="Titre 1">
-            <a:extLst>
-              <a:ext uri="{FF2B5EF4-FFF2-40B4-BE49-F238E27FC236}">
-                <a16:creationId xmlns:a16="http://schemas.microsoft.com/office/drawing/2014/main" id="{7F88D680-1DDE-5C04-3730-1F70CE67607A}"/>
-              </a:ext>
-            </a:extLst>
-          </p:cNvPr>
-          <p:cNvSpPr>
-            <a:spLocks noGrp="1"/>
-          </p:cNvSpPr>
-          <p:nvPr>
-            <p:ph type="title"/>
-          </p:nvPr>
-        </p:nvSpPr>
-        <p:spPr/>
-        <p:txBody>
-          <a:bodyPr/>
-          <a:lstStyle/>
-          <a:p>
-            <a:pPr algn="ctr"/>
+              <a:t>Jouve G., Martin A., Maire O., </a:t>
+            </a:r>
+            <a:r>
+              <a:rPr lang="fr-FR" dirty="0" err="1"/>
+              <a:t>Carlucci</a:t>
+            </a:r>
             <a:r>
               <a:rPr lang="fr-FR" dirty="0"/>
-              <a:t>Prochaines étapes</a:t>
-            </a:r>
-          </a:p>
-        </p:txBody>
-      </p:sp>
-      <p:sp>
-        <p:nvSpPr>
-          <p:cNvPr id="4" name="Espace réservé du numéro de diapositive 3">
-            <a:extLst>
-              <a:ext uri="{FF2B5EF4-FFF2-40B4-BE49-F238E27FC236}">
-                <a16:creationId xmlns:a16="http://schemas.microsoft.com/office/drawing/2014/main" id="{2D48D084-C594-67B8-AB74-489B24D8ECF5}"/>
-              </a:ext>
-            </a:extLst>
-          </p:cNvPr>
-          <p:cNvSpPr>
-            <a:spLocks noGrp="1"/>
-          </p:cNvSpPr>
-          <p:nvPr>
-            <p:ph type="sldNum" sz="quarter" idx="12"/>
-          </p:nvPr>
-        </p:nvSpPr>
-        <p:spPr/>
-        <p:txBody>
-          <a:bodyPr/>
-          <a:lstStyle/>
-          <a:p>
-            <a:fld id="{DC2E16F3-7CBC-431B-A389-3AC051105C99}" type="slidenum">
-              <a:rPr lang="fr-FR" smtClean="0"/>
-              <a:t>5</a:t>
-            </a:fld>
-            <a:endParaRPr lang="fr-FR"/>
+              <a:t> </a:t>
+            </a:r>
+            <a:r>
+              <a:rPr lang="fr-FR" dirty="0" err="1"/>
+              <a:t>T</a:t>
+            </a:r>
+            <a:r>
+              <a:rPr lang="fr-FR" dirty="0"/>
+              <a:t>.</a:t>
+            </a:r>
           </a:p>
         </p:txBody>
       </p:sp>
@@ -5497,261 +5835,6 @@
   <p:clrMapOvr>
     <a:masterClrMapping/>
   </p:clrMapOvr>
-</p:sld>
-</file>
-
-<file path=ppt/slides/slide6.xml><?xml version="1.0" encoding="utf-8"?>
-<p:sld xmlns:a="http://schemas.openxmlformats.org/drawingml/2006/main" xmlns:r="http://schemas.openxmlformats.org/officeDocument/2006/relationships" xmlns:p="http://schemas.openxmlformats.org/presentationml/2006/main">
-  <p:cSld>
-    <p:spTree>
-      <p:nvGrpSpPr>
-        <p:cNvPr id="1" name=""/>
-        <p:cNvGrpSpPr/>
-        <p:nvPr/>
-      </p:nvGrpSpPr>
-      <p:grpSpPr>
-        <a:xfrm>
-          <a:off x="0" y="0"/>
-          <a:ext cx="0" cy="0"/>
-          <a:chOff x="0" y="0"/>
-          <a:chExt cx="0" cy="0"/>
-        </a:xfrm>
-      </p:grpSpPr>
-      <p:sp>
-        <p:nvSpPr>
-          <p:cNvPr id="3" name="Espace réservé du numéro de diapositive 2">
-            <a:extLst>
-              <a:ext uri="{FF2B5EF4-FFF2-40B4-BE49-F238E27FC236}">
-                <a16:creationId xmlns:a16="http://schemas.microsoft.com/office/drawing/2014/main" id="{BCAFF91F-FC1B-0DA9-0E36-9BA6852332E1}"/>
-              </a:ext>
-            </a:extLst>
-          </p:cNvPr>
-          <p:cNvSpPr>
-            <a:spLocks noGrp="1"/>
-          </p:cNvSpPr>
-          <p:nvPr>
-            <p:ph type="sldNum" sz="quarter" idx="12"/>
-          </p:nvPr>
-        </p:nvSpPr>
-        <p:spPr/>
-        <p:txBody>
-          <a:bodyPr/>
-          <a:lstStyle/>
-          <a:p>
-            <a:fld id="{DC2E16F3-7CBC-431B-A389-3AC051105C99}" type="slidenum">
-              <a:rPr lang="fr-FR" smtClean="0"/>
-              <a:t>6</a:t>
-            </a:fld>
-            <a:endParaRPr lang="fr-FR"/>
-          </a:p>
-        </p:txBody>
-      </p:sp>
-      <p:pic>
-        <p:nvPicPr>
-          <p:cNvPr id="2052" name="Picture 4" descr="Vie locale - A vous la parole - DESIR A Poncins">
-            <a:extLst>
-              <a:ext uri="{FF2B5EF4-FFF2-40B4-BE49-F238E27FC236}">
-                <a16:creationId xmlns:a16="http://schemas.microsoft.com/office/drawing/2014/main" id="{E6941DC6-6967-C9C7-A91A-6993E409D032}"/>
-              </a:ext>
-            </a:extLst>
-          </p:cNvPr>
-          <p:cNvPicPr>
-            <a:picLocks noChangeAspect="1" noChangeArrowheads="1"/>
-          </p:cNvPicPr>
-          <p:nvPr/>
-        </p:nvPicPr>
-        <p:blipFill>
-          <a:blip r:embed="rId3">
-            <a:extLst>
-              <a:ext uri="{28A0092B-C50C-407E-A947-70E740481C1C}">
-                <a14:useLocalDpi xmlns:a14="http://schemas.microsoft.com/office/drawing/2010/main" val="0"/>
-              </a:ext>
-            </a:extLst>
-          </a:blip>
-          <a:srcRect/>
-          <a:stretch>
-            <a:fillRect/>
-          </a:stretch>
-        </p:blipFill>
-        <p:spPr bwMode="auto">
-          <a:xfrm>
-            <a:off x="3127573" y="1845734"/>
-            <a:ext cx="3295650" cy="2615595"/>
-          </a:xfrm>
-          <a:prstGeom prst="rect">
-            <a:avLst/>
-          </a:prstGeom>
-          <a:noFill/>
-          <a:extLst>
-            <a:ext uri="{909E8E84-426E-40DD-AFC4-6F175D3DCCD1}">
-              <a14:hiddenFill xmlns:a14="http://schemas.microsoft.com/office/drawing/2010/main">
-                <a:solidFill>
-                  <a:srgbClr val="FFFFFF"/>
-                </a:solidFill>
-              </a14:hiddenFill>
-            </a:ext>
-          </a:extLst>
-        </p:spPr>
-      </p:pic>
-      <p:pic>
-        <p:nvPicPr>
-          <p:cNvPr id="2054" name="Picture 6" descr="Les techniques de l'interview client ou l'art de poser des questions –  Votre Coach Commercial">
-            <a:extLst>
-              <a:ext uri="{FF2B5EF4-FFF2-40B4-BE49-F238E27FC236}">
-                <a16:creationId xmlns:a16="http://schemas.microsoft.com/office/drawing/2014/main" id="{5898358C-5027-CD5A-FEA5-C7467977FB40}"/>
-              </a:ext>
-            </a:extLst>
-          </p:cNvPr>
-          <p:cNvPicPr>
-            <a:picLocks noChangeAspect="1" noChangeArrowheads="1"/>
-          </p:cNvPicPr>
-          <p:nvPr/>
-        </p:nvPicPr>
-        <p:blipFill>
-          <a:blip r:embed="rId4">
-            <a:extLst>
-              <a:ext uri="{28A0092B-C50C-407E-A947-70E740481C1C}">
-                <a14:useLocalDpi xmlns:a14="http://schemas.microsoft.com/office/drawing/2010/main" val="0"/>
-              </a:ext>
-            </a:extLst>
-          </a:blip>
-          <a:srcRect/>
-          <a:stretch>
-            <a:fillRect/>
-          </a:stretch>
-        </p:blipFill>
-        <p:spPr bwMode="auto">
-          <a:xfrm>
-            <a:off x="6423223" y="1834102"/>
-            <a:ext cx="2524125" cy="2638858"/>
-          </a:xfrm>
-          <a:prstGeom prst="rect">
-            <a:avLst/>
-          </a:prstGeom>
-          <a:noFill/>
-          <a:extLst>
-            <a:ext uri="{909E8E84-426E-40DD-AFC4-6F175D3DCCD1}">
-              <a14:hiddenFill xmlns:a14="http://schemas.microsoft.com/office/drawing/2010/main">
-                <a:solidFill>
-                  <a:srgbClr val="FFFFFF"/>
-                </a:solidFill>
-              </a14:hiddenFill>
-            </a:ext>
-          </a:extLst>
-        </p:spPr>
-      </p:pic>
-    </p:spTree>
-    <p:extLst>
-      <p:ext uri="{BB962C8B-B14F-4D97-AF65-F5344CB8AC3E}">
-        <p14:creationId xmlns:p14="http://schemas.microsoft.com/office/powerpoint/2010/main" val="3144301634"/>
-      </p:ext>
-    </p:extLst>
-  </p:cSld>
-  <p:clrMapOvr>
-    <a:masterClrMapping/>
-  </p:clrMapOvr>
-  <p:timing>
-    <p:tnLst>
-      <p:par>
-        <p:cTn id="1" dur="indefinite" restart="never" nodeType="tmRoot">
-          <p:childTnLst>
-            <p:seq concurrent="1" nextAc="seek">
-              <p:cTn id="2" dur="indefinite" nodeType="mainSeq">
-                <p:childTnLst>
-                  <p:par>
-                    <p:cTn id="3" fill="hold">
-                      <p:stCondLst>
-                        <p:cond delay="indefinite"/>
-                      </p:stCondLst>
-                      <p:childTnLst>
-                        <p:par>
-                          <p:cTn id="4" fill="hold">
-                            <p:stCondLst>
-                              <p:cond delay="0"/>
-                            </p:stCondLst>
-                            <p:childTnLst>
-                              <p:par>
-                                <p:cTn id="5" presetID="1" presetClass="entr" presetSubtype="0" fill="hold" nodeType="clickEffect">
-                                  <p:stCondLst>
-                                    <p:cond delay="0"/>
-                                  </p:stCondLst>
-                                  <p:childTnLst>
-                                    <p:set>
-                                      <p:cBhvr>
-                                        <p:cTn id="6" dur="1" fill="hold">
-                                          <p:stCondLst>
-                                            <p:cond delay="0"/>
-                                          </p:stCondLst>
-                                        </p:cTn>
-                                        <p:tgtEl>
-                                          <p:spTgt spid="2052"/>
-                                        </p:tgtEl>
-                                        <p:attrNameLst>
-                                          <p:attrName>style.visibility</p:attrName>
-                                        </p:attrNameLst>
-                                      </p:cBhvr>
-                                      <p:to>
-                                        <p:strVal val="visible"/>
-                                      </p:to>
-                                    </p:set>
-                                  </p:childTnLst>
-                                </p:cTn>
-                              </p:par>
-                              <p:par>
-                                <p:cTn id="7" presetID="1" presetClass="entr" presetSubtype="0" fill="hold" nodeType="withEffect">
-                                  <p:stCondLst>
-                                    <p:cond delay="0"/>
-                                  </p:stCondLst>
-                                  <p:childTnLst>
-                                    <p:set>
-                                      <p:cBhvr>
-                                        <p:cTn id="8" dur="1" fill="hold">
-                                          <p:stCondLst>
-                                            <p:cond delay="0"/>
-                                          </p:stCondLst>
-                                        </p:cTn>
-                                        <p:tgtEl>
-                                          <p:spTgt spid="2054"/>
-                                        </p:tgtEl>
-                                        <p:attrNameLst>
-                                          <p:attrName>style.visibility</p:attrName>
-                                        </p:attrNameLst>
-                                      </p:cBhvr>
-                                      <p:to>
-                                        <p:strVal val="visible"/>
-                                      </p:to>
-                                    </p:set>
-                                  </p:childTnLst>
-                                </p:cTn>
-                              </p:par>
-                            </p:childTnLst>
-                          </p:cTn>
-                        </p:par>
-                      </p:childTnLst>
-                    </p:cTn>
-                  </p:par>
-                </p:childTnLst>
-              </p:cTn>
-              <p:prevCondLst>
-                <p:cond evt="onPrev" delay="0">
-                  <p:tgtEl>
-                    <p:sldTgt/>
-                  </p:tgtEl>
-                </p:cond>
-              </p:prevCondLst>
-              <p:nextCondLst>
-                <p:cond evt="onNext" delay="0">
-                  <p:tgtEl>
-                    <p:sldTgt/>
-                  </p:tgtEl>
-                </p:cond>
-              </p:nextCondLst>
-            </p:seq>
-          </p:childTnLst>
-        </p:cTn>
-      </p:par>
-    </p:tnLst>
-  </p:timing>
 </p:sld>
 </file>
 
@@ -6351,4 +6434,299 @@
     </a:ext>
   </a:extLst>
 </a:theme>
+</file>
+
+<file path=ppt/theme/theme3.xml><?xml version="1.0" encoding="utf-8"?>
+<a:theme xmlns:a="http://schemas.openxmlformats.org/drawingml/2006/main" name="Thème Office">
+  <a:themeElements>
+    <a:clrScheme name="Office">
+      <a:dk1>
+        <a:sysClr val="windowText" lastClr="000000"/>
+      </a:dk1>
+      <a:lt1>
+        <a:sysClr val="window" lastClr="FFFFFF"/>
+      </a:lt1>
+      <a:dk2>
+        <a:srgbClr val="44546A"/>
+      </a:dk2>
+      <a:lt2>
+        <a:srgbClr val="E7E6E6"/>
+      </a:lt2>
+      <a:accent1>
+        <a:srgbClr val="4472C4"/>
+      </a:accent1>
+      <a:accent2>
+        <a:srgbClr val="ED7D31"/>
+      </a:accent2>
+      <a:accent3>
+        <a:srgbClr val="A5A5A5"/>
+      </a:accent3>
+      <a:accent4>
+        <a:srgbClr val="FFC000"/>
+      </a:accent4>
+      <a:accent5>
+        <a:srgbClr val="5B9BD5"/>
+      </a:accent5>
+      <a:accent6>
+        <a:srgbClr val="70AD47"/>
+      </a:accent6>
+      <a:hlink>
+        <a:srgbClr val="0563C1"/>
+      </a:hlink>
+      <a:folHlink>
+        <a:srgbClr val="954F72"/>
+      </a:folHlink>
+    </a:clrScheme>
+    <a:fontScheme name="Office">
+      <a:majorFont>
+        <a:latin typeface="Calibri Light" panose="020F0302020204030204"/>
+        <a:ea typeface=""/>
+        <a:cs typeface=""/>
+        <a:font script="Jpan" typeface="游ゴシック Light"/>
+        <a:font script="Hang" typeface="맑은 고딕"/>
+        <a:font script="Hans" typeface="等线 Light"/>
+        <a:font script="Hant" typeface="新細明體"/>
+        <a:font script="Arab" typeface="Times New Roman"/>
+        <a:font script="Hebr" typeface="Times New Roman"/>
+        <a:font script="Thai" typeface="Angsana New"/>
+        <a:font script="Ethi" typeface="Nyala"/>
+        <a:font script="Beng" typeface="Vrinda"/>
+        <a:font script="Gujr" typeface="Shruti"/>
+        <a:font script="Khmr" typeface="MoolBoran"/>
+        <a:font script="Knda" typeface="Tunga"/>
+        <a:font script="Guru" typeface="Raavi"/>
+        <a:font script="Cans" typeface="Euphemia"/>
+        <a:font script="Cher" typeface="Plantagenet Cherokee"/>
+        <a:font script="Yiii" typeface="Microsoft Yi Baiti"/>
+        <a:font script="Tibt" typeface="Microsoft Himalaya"/>
+        <a:font script="Thaa" typeface="MV Boli"/>
+        <a:font script="Deva" typeface="Mangal"/>
+        <a:font script="Telu" typeface="Gautami"/>
+        <a:font script="Taml" typeface="Latha"/>
+        <a:font script="Syrc" typeface="Estrangelo Edessa"/>
+        <a:font script="Orya" typeface="Kalinga"/>
+        <a:font script="Mlym" typeface="Kartika"/>
+        <a:font script="Laoo" typeface="DokChampa"/>
+        <a:font script="Sinh" typeface="Iskoola Pota"/>
+        <a:font script="Mong" typeface="Mongolian Baiti"/>
+        <a:font script="Viet" typeface="Times New Roman"/>
+        <a:font script="Uigh" typeface="Microsoft Uighur"/>
+        <a:font script="Geor" typeface="Sylfaen"/>
+        <a:font script="Armn" typeface="Arial"/>
+        <a:font script="Bugi" typeface="Leelawadee UI"/>
+        <a:font script="Bopo" typeface="Microsoft JhengHei"/>
+        <a:font script="Java" typeface="Javanese Text"/>
+        <a:font script="Lisu" typeface="Segoe UI"/>
+        <a:font script="Mymr" typeface="Myanmar Text"/>
+        <a:font script="Nkoo" typeface="Ebrima"/>
+        <a:font script="Olck" typeface="Nirmala UI"/>
+        <a:font script="Osma" typeface="Ebrima"/>
+        <a:font script="Phag" typeface="Phagspa"/>
+        <a:font script="Syrn" typeface="Estrangelo Edessa"/>
+        <a:font script="Syrj" typeface="Estrangelo Edessa"/>
+        <a:font script="Syre" typeface="Estrangelo Edessa"/>
+        <a:font script="Sora" typeface="Nirmala UI"/>
+        <a:font script="Tale" typeface="Microsoft Tai Le"/>
+        <a:font script="Talu" typeface="Microsoft New Tai Lue"/>
+        <a:font script="Tfng" typeface="Ebrima"/>
+      </a:majorFont>
+      <a:minorFont>
+        <a:latin typeface="Calibri" panose="020F0502020204030204"/>
+        <a:ea typeface=""/>
+        <a:cs typeface=""/>
+        <a:font script="Jpan" typeface="游ゴシック"/>
+        <a:font script="Hang" typeface="맑은 고딕"/>
+        <a:font script="Hans" typeface="等线"/>
+        <a:font script="Hant" typeface="新細明體"/>
+        <a:font script="Arab" typeface="Arial"/>
+        <a:font script="Hebr" typeface="Arial"/>
+        <a:font script="Thai" typeface="Cordia New"/>
+        <a:font script="Ethi" typeface="Nyala"/>
+        <a:font script="Beng" typeface="Vrinda"/>
+        <a:font script="Gujr" typeface="Shruti"/>
+        <a:font script="Khmr" typeface="DaunPenh"/>
+        <a:font script="Knda" typeface="Tunga"/>
+        <a:font script="Guru" typeface="Raavi"/>
+        <a:font script="Cans" typeface="Euphemia"/>
+        <a:font script="Cher" typeface="Plantagenet Cherokee"/>
+        <a:font script="Yiii" typeface="Microsoft Yi Baiti"/>
+        <a:font script="Tibt" typeface="Microsoft Himalaya"/>
+        <a:font script="Thaa" typeface="MV Boli"/>
+        <a:font script="Deva" typeface="Mangal"/>
+        <a:font script="Telu" typeface="Gautami"/>
+        <a:font script="Taml" typeface="Latha"/>
+        <a:font script="Syrc" typeface="Estrangelo Edessa"/>
+        <a:font script="Orya" typeface="Kalinga"/>
+        <a:font script="Mlym" typeface="Kartika"/>
+        <a:font script="Laoo" typeface="DokChampa"/>
+        <a:font script="Sinh" typeface="Iskoola Pota"/>
+        <a:font script="Mong" typeface="Mongolian Baiti"/>
+        <a:font script="Viet" typeface="Arial"/>
+        <a:font script="Uigh" typeface="Microsoft Uighur"/>
+        <a:font script="Geor" typeface="Sylfaen"/>
+        <a:font script="Armn" typeface="Arial"/>
+        <a:font script="Bugi" typeface="Leelawadee UI"/>
+        <a:font script="Bopo" typeface="Microsoft JhengHei"/>
+        <a:font script="Java" typeface="Javanese Text"/>
+        <a:font script="Lisu" typeface="Segoe UI"/>
+        <a:font script="Mymr" typeface="Myanmar Text"/>
+        <a:font script="Nkoo" typeface="Ebrima"/>
+        <a:font script="Olck" typeface="Nirmala UI"/>
+        <a:font script="Osma" typeface="Ebrima"/>
+        <a:font script="Phag" typeface="Phagspa"/>
+        <a:font script="Syrn" typeface="Estrangelo Edessa"/>
+        <a:font script="Syrj" typeface="Estrangelo Edessa"/>
+        <a:font script="Syre" typeface="Estrangelo Edessa"/>
+        <a:font script="Sora" typeface="Nirmala UI"/>
+        <a:font script="Tale" typeface="Microsoft Tai Le"/>
+        <a:font script="Talu" typeface="Microsoft New Tai Lue"/>
+        <a:font script="Tfng" typeface="Ebrima"/>
+      </a:minorFont>
+    </a:fontScheme>
+    <a:fmtScheme name="Office">
+      <a:fillStyleLst>
+        <a:solidFill>
+          <a:schemeClr val="phClr"/>
+        </a:solidFill>
+        <a:gradFill rotWithShape="1">
+          <a:gsLst>
+            <a:gs pos="0">
+              <a:schemeClr val="phClr">
+                <a:lumMod val="110000"/>
+                <a:satMod val="105000"/>
+                <a:tint val="67000"/>
+              </a:schemeClr>
+            </a:gs>
+            <a:gs pos="50000">
+              <a:schemeClr val="phClr">
+                <a:lumMod val="105000"/>
+                <a:satMod val="103000"/>
+                <a:tint val="73000"/>
+              </a:schemeClr>
+            </a:gs>
+            <a:gs pos="100000">
+              <a:schemeClr val="phClr">
+                <a:lumMod val="105000"/>
+                <a:satMod val="109000"/>
+                <a:tint val="81000"/>
+              </a:schemeClr>
+            </a:gs>
+          </a:gsLst>
+          <a:lin ang="5400000" scaled="0"/>
+        </a:gradFill>
+        <a:gradFill rotWithShape="1">
+          <a:gsLst>
+            <a:gs pos="0">
+              <a:schemeClr val="phClr">
+                <a:satMod val="103000"/>
+                <a:lumMod val="102000"/>
+                <a:tint val="94000"/>
+              </a:schemeClr>
+            </a:gs>
+            <a:gs pos="50000">
+              <a:schemeClr val="phClr">
+                <a:satMod val="110000"/>
+                <a:lumMod val="100000"/>
+                <a:shade val="100000"/>
+              </a:schemeClr>
+            </a:gs>
+            <a:gs pos="100000">
+              <a:schemeClr val="phClr">
+                <a:lumMod val="99000"/>
+                <a:satMod val="120000"/>
+                <a:shade val="78000"/>
+              </a:schemeClr>
+            </a:gs>
+          </a:gsLst>
+          <a:lin ang="5400000" scaled="0"/>
+        </a:gradFill>
+      </a:fillStyleLst>
+      <a:lnStyleLst>
+        <a:ln w="6350" cap="flat" cmpd="sng" algn="ctr">
+          <a:solidFill>
+            <a:schemeClr val="phClr"/>
+          </a:solidFill>
+          <a:prstDash val="solid"/>
+          <a:miter lim="800000"/>
+        </a:ln>
+        <a:ln w="12700" cap="flat" cmpd="sng" algn="ctr">
+          <a:solidFill>
+            <a:schemeClr val="phClr"/>
+          </a:solidFill>
+          <a:prstDash val="solid"/>
+          <a:miter lim="800000"/>
+        </a:ln>
+        <a:ln w="19050" cap="flat" cmpd="sng" algn="ctr">
+          <a:solidFill>
+            <a:schemeClr val="phClr"/>
+          </a:solidFill>
+          <a:prstDash val="solid"/>
+          <a:miter lim="800000"/>
+        </a:ln>
+      </a:lnStyleLst>
+      <a:effectStyleLst>
+        <a:effectStyle>
+          <a:effectLst/>
+        </a:effectStyle>
+        <a:effectStyle>
+          <a:effectLst/>
+        </a:effectStyle>
+        <a:effectStyle>
+          <a:effectLst>
+            <a:outerShdw blurRad="57150" dist="19050" dir="5400000" algn="ctr" rotWithShape="0">
+              <a:srgbClr val="000000">
+                <a:alpha val="63000"/>
+              </a:srgbClr>
+            </a:outerShdw>
+          </a:effectLst>
+        </a:effectStyle>
+      </a:effectStyleLst>
+      <a:bgFillStyleLst>
+        <a:solidFill>
+          <a:schemeClr val="phClr"/>
+        </a:solidFill>
+        <a:solidFill>
+          <a:schemeClr val="phClr">
+            <a:tint val="95000"/>
+            <a:satMod val="170000"/>
+          </a:schemeClr>
+        </a:solidFill>
+        <a:gradFill rotWithShape="1">
+          <a:gsLst>
+            <a:gs pos="0">
+              <a:schemeClr val="phClr">
+                <a:tint val="93000"/>
+                <a:satMod val="150000"/>
+                <a:shade val="98000"/>
+                <a:lumMod val="102000"/>
+              </a:schemeClr>
+            </a:gs>
+            <a:gs pos="50000">
+              <a:schemeClr val="phClr">
+                <a:tint val="98000"/>
+                <a:satMod val="130000"/>
+                <a:shade val="90000"/>
+                <a:lumMod val="103000"/>
+              </a:schemeClr>
+            </a:gs>
+            <a:gs pos="100000">
+              <a:schemeClr val="phClr">
+                <a:shade val="63000"/>
+                <a:satMod val="120000"/>
+              </a:schemeClr>
+            </a:gs>
+          </a:gsLst>
+          <a:lin ang="5400000" scaled="0"/>
+        </a:gradFill>
+      </a:bgFillStyleLst>
+    </a:fmtScheme>
+  </a:themeElements>
+  <a:objectDefaults/>
+  <a:extraClrSchemeLst/>
+  <a:extLst>
+    <a:ext uri="{05A4C25C-085E-4340-85A3-A5531E510DB2}">
+      <thm15:themeFamily xmlns:thm15="http://schemas.microsoft.com/office/thememl/2012/main" name="Office Theme" id="{62F939B6-93AF-4DB8-9C6B-D6C7DFDC589F}" vid="{4A3C46E8-61CC-4603-A589-7422A47A8E4A}"/>
+    </a:ext>
+  </a:extLst>
+</a:theme>
 </file>
</xml_diff>